<commit_message>
Instructions, Memory Limit and Mobile
- Changed the instructions files to better match the current advisors and online setup.
- Set a memory limit to hopefully address the 502 error.
- Added a check to stop users from carrying out the study on mobile.
</commit_message>
<xml_diff>
--- a/AdvisorChoice/instructions/Experiment 1a Instructions.pptx
+++ b/AdvisorChoice/instructions/Experiment 1a Instructions.pptx
@@ -225,7 +225,7 @@
           <a:p>
             <a:fld id="{2C27CEE3-7CDA-4780-9F85-765E50CB07F7}" type="datetimeFigureOut">
               <a:rPr lang="en-GB" smtClean="0"/>
-              <a:t>03/06/2019</a:t>
+              <a:t>31/07/2019</a:t>
             </a:fld>
             <a:endParaRPr lang="en-GB"/>
           </a:p>
@@ -674,7 +674,7 @@
           <a:p>
             <a:fld id="{0F3A0F3E-9580-46AF-A1DB-5E4659722DCF}" type="datetimeFigureOut">
               <a:rPr lang="en-GB" smtClean="0"/>
-              <a:t>03/06/2019</a:t>
+              <a:t>31/07/2019</a:t>
             </a:fld>
             <a:endParaRPr lang="en-GB"/>
           </a:p>
@@ -844,7 +844,7 @@
           <a:p>
             <a:fld id="{0F3A0F3E-9580-46AF-A1DB-5E4659722DCF}" type="datetimeFigureOut">
               <a:rPr lang="en-GB" smtClean="0"/>
-              <a:t>03/06/2019</a:t>
+              <a:t>31/07/2019</a:t>
             </a:fld>
             <a:endParaRPr lang="en-GB"/>
           </a:p>
@@ -1024,7 +1024,7 @@
           <a:p>
             <a:fld id="{0F3A0F3E-9580-46AF-A1DB-5E4659722DCF}" type="datetimeFigureOut">
               <a:rPr lang="en-GB" smtClean="0"/>
-              <a:t>03/06/2019</a:t>
+              <a:t>31/07/2019</a:t>
             </a:fld>
             <a:endParaRPr lang="en-GB"/>
           </a:p>
@@ -1194,7 +1194,7 @@
           <a:p>
             <a:fld id="{0F3A0F3E-9580-46AF-A1DB-5E4659722DCF}" type="datetimeFigureOut">
               <a:rPr lang="en-GB" smtClean="0"/>
-              <a:t>03/06/2019</a:t>
+              <a:t>31/07/2019</a:t>
             </a:fld>
             <a:endParaRPr lang="en-GB"/>
           </a:p>
@@ -1440,7 +1440,7 @@
           <a:p>
             <a:fld id="{0F3A0F3E-9580-46AF-A1DB-5E4659722DCF}" type="datetimeFigureOut">
               <a:rPr lang="en-GB" smtClean="0"/>
-              <a:t>03/06/2019</a:t>
+              <a:t>31/07/2019</a:t>
             </a:fld>
             <a:endParaRPr lang="en-GB"/>
           </a:p>
@@ -1728,7 +1728,7 @@
           <a:p>
             <a:fld id="{0F3A0F3E-9580-46AF-A1DB-5E4659722DCF}" type="datetimeFigureOut">
               <a:rPr lang="en-GB" smtClean="0"/>
-              <a:t>03/06/2019</a:t>
+              <a:t>31/07/2019</a:t>
             </a:fld>
             <a:endParaRPr lang="en-GB"/>
           </a:p>
@@ -2150,7 +2150,7 @@
           <a:p>
             <a:fld id="{0F3A0F3E-9580-46AF-A1DB-5E4659722DCF}" type="datetimeFigureOut">
               <a:rPr lang="en-GB" smtClean="0"/>
-              <a:t>03/06/2019</a:t>
+              <a:t>31/07/2019</a:t>
             </a:fld>
             <a:endParaRPr lang="en-GB"/>
           </a:p>
@@ -2268,7 +2268,7 @@
           <a:p>
             <a:fld id="{0F3A0F3E-9580-46AF-A1DB-5E4659722DCF}" type="datetimeFigureOut">
               <a:rPr lang="en-GB" smtClean="0"/>
-              <a:t>03/06/2019</a:t>
+              <a:t>31/07/2019</a:t>
             </a:fld>
             <a:endParaRPr lang="en-GB"/>
           </a:p>
@@ -2363,7 +2363,7 @@
           <a:p>
             <a:fld id="{0F3A0F3E-9580-46AF-A1DB-5E4659722DCF}" type="datetimeFigureOut">
               <a:rPr lang="en-GB" smtClean="0"/>
-              <a:t>03/06/2019</a:t>
+              <a:t>31/07/2019</a:t>
             </a:fld>
             <a:endParaRPr lang="en-GB"/>
           </a:p>
@@ -2640,7 +2640,7 @@
           <a:p>
             <a:fld id="{0F3A0F3E-9580-46AF-A1DB-5E4659722DCF}" type="datetimeFigureOut">
               <a:rPr lang="en-GB" smtClean="0"/>
-              <a:t>03/06/2019</a:t>
+              <a:t>31/07/2019</a:t>
             </a:fld>
             <a:endParaRPr lang="en-GB"/>
           </a:p>
@@ -2893,7 +2893,7 @@
           <a:p>
             <a:fld id="{0F3A0F3E-9580-46AF-A1DB-5E4659722DCF}" type="datetimeFigureOut">
               <a:rPr lang="en-GB" smtClean="0"/>
-              <a:t>03/06/2019</a:t>
+              <a:t>31/07/2019</a:t>
             </a:fld>
             <a:endParaRPr lang="en-GB"/>
           </a:p>
@@ -3109,7 +3109,7 @@
           <a:p>
             <a:fld id="{0F3A0F3E-9580-46AF-A1DB-5E4659722DCF}" type="datetimeFigureOut">
               <a:rPr lang="en-GB" smtClean="0"/>
-              <a:t>03/06/2019</a:t>
+              <a:t>31/07/2019</a:t>
             </a:fld>
             <a:endParaRPr lang="en-GB"/>
           </a:p>
@@ -4335,7 +4335,7 @@
                 <a:latin typeface="Arial" panose="020B0604020202020204" pitchFamily="34" charset="0"/>
                 <a:cs typeface="Arial" panose="020B0604020202020204" pitchFamily="34" charset="0"/>
               </a:rPr>
-              <a:t>Press </a:t>
+              <a:t>Click </a:t>
             </a:r>
             <a:r>
               <a:rPr lang="en-GB" b="1" dirty="0">
@@ -4348,7 +4348,7 @@
                 <a:latin typeface="Arial" panose="020B0604020202020204" pitchFamily="34" charset="0"/>
                 <a:cs typeface="Arial" panose="020B0604020202020204" pitchFamily="34" charset="0"/>
               </a:rPr>
-              <a:t>spacebar</a:t>
+              <a:t>continue</a:t>
             </a:r>
             <a:r>
               <a:rPr lang="en-GB" dirty="0">
@@ -4855,66 +4855,6 @@
           </a:p>
         </p:txBody>
       </p:sp>
-      <p:pic>
-        <p:nvPicPr>
-          <p:cNvPr id="7" name="Picture 6">
-            <a:extLst>
-              <a:ext uri="{FF2B5EF4-FFF2-40B4-BE49-F238E27FC236}">
-                <a16:creationId xmlns:a16="http://schemas.microsoft.com/office/drawing/2014/main" id="{F1140940-1D8F-4716-A639-450371373044}"/>
-              </a:ext>
-            </a:extLst>
-          </p:cNvPr>
-          <p:cNvPicPr>
-            <a:picLocks noChangeAspect="1"/>
-          </p:cNvPicPr>
-          <p:nvPr/>
-        </p:nvPicPr>
-        <p:blipFill>
-          <a:blip r:embed="rId2"/>
-          <a:stretch>
-            <a:fillRect/>
-          </a:stretch>
-        </p:blipFill>
-        <p:spPr>
-          <a:xfrm>
-            <a:off x="1979712" y="3356992"/>
-            <a:ext cx="1872208" cy="2469982"/>
-          </a:xfrm>
-          <a:prstGeom prst="rect">
-            <a:avLst/>
-          </a:prstGeom>
-        </p:spPr>
-      </p:pic>
-      <p:pic>
-        <p:nvPicPr>
-          <p:cNvPr id="8" name="Picture 7">
-            <a:extLst>
-              <a:ext uri="{FF2B5EF4-FFF2-40B4-BE49-F238E27FC236}">
-                <a16:creationId xmlns:a16="http://schemas.microsoft.com/office/drawing/2014/main" id="{D407973C-8876-4298-9D1D-C8A77D68C7A3}"/>
-              </a:ext>
-            </a:extLst>
-          </p:cNvPr>
-          <p:cNvPicPr>
-            <a:picLocks noChangeAspect="1"/>
-          </p:cNvPicPr>
-          <p:nvPr/>
-        </p:nvPicPr>
-        <p:blipFill>
-          <a:blip r:embed="rId3"/>
-          <a:stretch>
-            <a:fillRect/>
-          </a:stretch>
-        </p:blipFill>
-        <p:spPr>
-          <a:xfrm>
-            <a:off x="5825342" y="3407925"/>
-            <a:ext cx="1865422" cy="2396293"/>
-          </a:xfrm>
-          <a:prstGeom prst="rect">
-            <a:avLst/>
-          </a:prstGeom>
-        </p:spPr>
-      </p:pic>
       <p:sp>
         <p:nvSpPr>
           <p:cNvPr id="9" name="TextBox 8">
@@ -4959,6 +4899,76 @@
           </a:p>
         </p:txBody>
       </p:sp>
+      <p:pic>
+        <p:nvPicPr>
+          <p:cNvPr id="4" name="Picture 3">
+            <a:extLst>
+              <a:ext uri="{FF2B5EF4-FFF2-40B4-BE49-F238E27FC236}">
+                <a16:creationId xmlns:a16="http://schemas.microsoft.com/office/drawing/2014/main" id="{A85843C4-7E20-F946-A230-BB7658524B26}"/>
+              </a:ext>
+            </a:extLst>
+          </p:cNvPr>
+          <p:cNvPicPr>
+            <a:picLocks noChangeAspect="1"/>
+          </p:cNvPicPr>
+          <p:nvPr/>
+        </p:nvPicPr>
+        <p:blipFill rotWithShape="1">
+          <a:blip r:embed="rId2">
+            <a:extLst>
+              <a:ext uri="{28A0092B-C50C-407E-A947-70E740481C1C}">
+                <a14:useLocalDpi xmlns:a14="http://schemas.microsoft.com/office/drawing/2010/main" val="0"/>
+              </a:ext>
+            </a:extLst>
+          </a:blip>
+          <a:srcRect l="1263" t="3037" r="1733" b="4008"/>
+          <a:stretch/>
+        </p:blipFill>
+        <p:spPr>
+          <a:xfrm>
+            <a:off x="236089" y="3671706"/>
+            <a:ext cx="4032449" cy="1125446"/>
+          </a:xfrm>
+          <a:prstGeom prst="rect">
+            <a:avLst/>
+          </a:prstGeom>
+        </p:spPr>
+      </p:pic>
+      <p:pic>
+        <p:nvPicPr>
+          <p:cNvPr id="10" name="Picture 9">
+            <a:extLst>
+              <a:ext uri="{FF2B5EF4-FFF2-40B4-BE49-F238E27FC236}">
+                <a16:creationId xmlns:a16="http://schemas.microsoft.com/office/drawing/2014/main" id="{7C700381-817E-544E-AF68-F829F5E9500B}"/>
+              </a:ext>
+            </a:extLst>
+          </p:cNvPr>
+          <p:cNvPicPr>
+            <a:picLocks noChangeAspect="1"/>
+          </p:cNvPicPr>
+          <p:nvPr/>
+        </p:nvPicPr>
+        <p:blipFill rotWithShape="1">
+          <a:blip r:embed="rId3">
+            <a:extLst>
+              <a:ext uri="{28A0092B-C50C-407E-A947-70E740481C1C}">
+                <a14:useLocalDpi xmlns:a14="http://schemas.microsoft.com/office/drawing/2010/main" val="0"/>
+              </a:ext>
+            </a:extLst>
+          </a:blip>
+          <a:srcRect l="1674" t="5091" r="1241" b="7045"/>
+          <a:stretch/>
+        </p:blipFill>
+        <p:spPr>
+          <a:xfrm>
+            <a:off x="4499992" y="3671706"/>
+            <a:ext cx="4407919" cy="1122769"/>
+          </a:xfrm>
+          <a:prstGeom prst="rect">
+            <a:avLst/>
+          </a:prstGeom>
+        </p:spPr>
+      </p:pic>
     </p:spTree>
     <p:extLst>
       <p:ext uri="{BB962C8B-B14F-4D97-AF65-F5344CB8AC3E}">

</xml_diff>

<commit_message>
Age Check, Instructions and Index Changes
- Chnaged age check to remove the upper age limit.
- Instructions updated to accomodate block 4 trials (and removed some errors)
- Index Html changed for presentation purposes.
- Added a thank you page at the end of the study.
</commit_message>
<xml_diff>
--- a/AdvisorChoice/instructions/Experiment 1a Instructions.pptx
+++ b/AdvisorChoice/instructions/Experiment 1a Instructions.pptx
@@ -5,7 +5,7 @@
     <p:sldMasterId id="2147483660" r:id="rId1"/>
   </p:sldMasterIdLst>
   <p:notesMasterIdLst>
-    <p:notesMasterId r:id="rId20"/>
+    <p:notesMasterId r:id="rId26"/>
   </p:notesMasterIdLst>
   <p:sldIdLst>
     <p:sldId id="256" r:id="rId2"/>
@@ -26,6 +26,12 @@
     <p:sldId id="278" r:id="rId17"/>
     <p:sldId id="273" r:id="rId18"/>
     <p:sldId id="261" r:id="rId19"/>
+    <p:sldId id="280" r:id="rId20"/>
+    <p:sldId id="281" r:id="rId21"/>
+    <p:sldId id="282" r:id="rId22"/>
+    <p:sldId id="283" r:id="rId23"/>
+    <p:sldId id="284" r:id="rId24"/>
+    <p:sldId id="285" r:id="rId25"/>
   </p:sldIdLst>
   <p:sldSz cx="9144000" cy="6858000" type="screen4x3"/>
   <p:notesSz cx="6858000" cy="9144000"/>
@@ -225,7 +231,7 @@
           <a:p>
             <a:fld id="{2C27CEE3-7CDA-4780-9F85-765E50CB07F7}" type="datetimeFigureOut">
               <a:rPr lang="en-GB" smtClean="0"/>
-              <a:t>31/07/2019</a:t>
+              <a:t>13/08/2019</a:t>
             </a:fld>
             <a:endParaRPr lang="en-GB"/>
           </a:p>
@@ -674,7 +680,7 @@
           <a:p>
             <a:fld id="{0F3A0F3E-9580-46AF-A1DB-5E4659722DCF}" type="datetimeFigureOut">
               <a:rPr lang="en-GB" smtClean="0"/>
-              <a:t>31/07/2019</a:t>
+              <a:t>13/08/2019</a:t>
             </a:fld>
             <a:endParaRPr lang="en-GB"/>
           </a:p>
@@ -844,7 +850,7 @@
           <a:p>
             <a:fld id="{0F3A0F3E-9580-46AF-A1DB-5E4659722DCF}" type="datetimeFigureOut">
               <a:rPr lang="en-GB" smtClean="0"/>
-              <a:t>31/07/2019</a:t>
+              <a:t>13/08/2019</a:t>
             </a:fld>
             <a:endParaRPr lang="en-GB"/>
           </a:p>
@@ -1024,7 +1030,7 @@
           <a:p>
             <a:fld id="{0F3A0F3E-9580-46AF-A1DB-5E4659722DCF}" type="datetimeFigureOut">
               <a:rPr lang="en-GB" smtClean="0"/>
-              <a:t>31/07/2019</a:t>
+              <a:t>13/08/2019</a:t>
             </a:fld>
             <a:endParaRPr lang="en-GB"/>
           </a:p>
@@ -1194,7 +1200,7 @@
           <a:p>
             <a:fld id="{0F3A0F3E-9580-46AF-A1DB-5E4659722DCF}" type="datetimeFigureOut">
               <a:rPr lang="en-GB" smtClean="0"/>
-              <a:t>31/07/2019</a:t>
+              <a:t>13/08/2019</a:t>
             </a:fld>
             <a:endParaRPr lang="en-GB"/>
           </a:p>
@@ -1440,7 +1446,7 @@
           <a:p>
             <a:fld id="{0F3A0F3E-9580-46AF-A1DB-5E4659722DCF}" type="datetimeFigureOut">
               <a:rPr lang="en-GB" smtClean="0"/>
-              <a:t>31/07/2019</a:t>
+              <a:t>13/08/2019</a:t>
             </a:fld>
             <a:endParaRPr lang="en-GB"/>
           </a:p>
@@ -1728,7 +1734,7 @@
           <a:p>
             <a:fld id="{0F3A0F3E-9580-46AF-A1DB-5E4659722DCF}" type="datetimeFigureOut">
               <a:rPr lang="en-GB" smtClean="0"/>
-              <a:t>31/07/2019</a:t>
+              <a:t>13/08/2019</a:t>
             </a:fld>
             <a:endParaRPr lang="en-GB"/>
           </a:p>
@@ -2150,7 +2156,7 @@
           <a:p>
             <a:fld id="{0F3A0F3E-9580-46AF-A1DB-5E4659722DCF}" type="datetimeFigureOut">
               <a:rPr lang="en-GB" smtClean="0"/>
-              <a:t>31/07/2019</a:t>
+              <a:t>13/08/2019</a:t>
             </a:fld>
             <a:endParaRPr lang="en-GB"/>
           </a:p>
@@ -2268,7 +2274,7 @@
           <a:p>
             <a:fld id="{0F3A0F3E-9580-46AF-A1DB-5E4659722DCF}" type="datetimeFigureOut">
               <a:rPr lang="en-GB" smtClean="0"/>
-              <a:t>31/07/2019</a:t>
+              <a:t>13/08/2019</a:t>
             </a:fld>
             <a:endParaRPr lang="en-GB"/>
           </a:p>
@@ -2363,7 +2369,7 @@
           <a:p>
             <a:fld id="{0F3A0F3E-9580-46AF-A1DB-5E4659722DCF}" type="datetimeFigureOut">
               <a:rPr lang="en-GB" smtClean="0"/>
-              <a:t>31/07/2019</a:t>
+              <a:t>13/08/2019</a:t>
             </a:fld>
             <a:endParaRPr lang="en-GB"/>
           </a:p>
@@ -2640,7 +2646,7 @@
           <a:p>
             <a:fld id="{0F3A0F3E-9580-46AF-A1DB-5E4659722DCF}" type="datetimeFigureOut">
               <a:rPr lang="en-GB" smtClean="0"/>
-              <a:t>31/07/2019</a:t>
+              <a:t>13/08/2019</a:t>
             </a:fld>
             <a:endParaRPr lang="en-GB"/>
           </a:p>
@@ -2893,7 +2899,7 @@
           <a:p>
             <a:fld id="{0F3A0F3E-9580-46AF-A1DB-5E4659722DCF}" type="datetimeFigureOut">
               <a:rPr lang="en-GB" smtClean="0"/>
-              <a:t>31/07/2019</a:t>
+              <a:t>13/08/2019</a:t>
             </a:fld>
             <a:endParaRPr lang="en-GB"/>
           </a:p>
@@ -3109,7 +3115,7 @@
           <a:p>
             <a:fld id="{0F3A0F3E-9580-46AF-A1DB-5E4659722DCF}" type="datetimeFigureOut">
               <a:rPr lang="en-GB" smtClean="0"/>
-              <a:t>31/07/2019</a:t>
+              <a:t>13/08/2019</a:t>
             </a:fld>
             <a:endParaRPr lang="en-GB"/>
           </a:p>
@@ -4166,7 +4172,7 @@
         <p:spPr>
           <a:xfrm>
             <a:off x="518599" y="620688"/>
-            <a:ext cx="8190305" cy="5355312"/>
+            <a:ext cx="8190305" cy="5078313"/>
           </a:xfrm>
           <a:prstGeom prst="rect">
             <a:avLst/>
@@ -4512,10 +4518,7 @@
             </a:endParaRPr>
           </a:p>
           <a:p>
-            <a:pPr marL="285750" indent="-285750" algn="ctr">
-              <a:buFont typeface="Arial" panose="020B0604020202020204" pitchFamily="34" charset="0"/>
-              <a:buChar char="•"/>
-            </a:pPr>
+            <a:pPr algn="ctr"/>
             <a:r>
               <a:rPr lang="en-GB" b="1" dirty="0">
                 <a:solidFill>
@@ -4528,25 +4531,6 @@
                 <a:cs typeface="Arial" panose="020B0604020202020204" pitchFamily="34" charset="0"/>
               </a:rPr>
               <a:t>You will now start a practice trial.</a:t>
-            </a:r>
-          </a:p>
-          <a:p>
-            <a:pPr marL="285750" indent="-285750" algn="ctr">
-              <a:buFont typeface="Arial" panose="020B0604020202020204" pitchFamily="34" charset="0"/>
-              <a:buChar char="•"/>
-            </a:pPr>
-            <a:r>
-              <a:rPr lang="en-GB" b="1" dirty="0">
-                <a:solidFill>
-                  <a:schemeClr val="bg1">
-                    <a:lumMod val="95000"/>
-                    <a:lumOff val="5000"/>
-                  </a:schemeClr>
-                </a:solidFill>
-                <a:latin typeface="Arial" panose="020B0604020202020204" pitchFamily="34" charset="0"/>
-                <a:cs typeface="Arial" panose="020B0604020202020204" pitchFamily="34" charset="0"/>
-              </a:rPr>
-              <a:t>Please call the experimenter if you have any questions.</a:t>
             </a:r>
           </a:p>
         </p:txBody>
@@ -5908,10 +5892,499 @@
           </a:p>
         </p:txBody>
       </p:sp>
+      <p:sp>
+        <p:nvSpPr>
+          <p:cNvPr id="4" name="TextBox 3">
+            <a:extLst>
+              <a:ext uri="{FF2B5EF4-FFF2-40B4-BE49-F238E27FC236}">
+                <a16:creationId xmlns:a16="http://schemas.microsoft.com/office/drawing/2014/main" id="{1DA9202B-57C5-5749-BD60-9EECA92D4530}"/>
+              </a:ext>
+            </a:extLst>
+          </p:cNvPr>
+          <p:cNvSpPr txBox="1"/>
+          <p:nvPr/>
+        </p:nvSpPr>
+        <p:spPr>
+          <a:xfrm>
+            <a:off x="476847" y="5373216"/>
+            <a:ext cx="8190305" cy="646331"/>
+          </a:xfrm>
+          <a:prstGeom prst="rect">
+            <a:avLst/>
+          </a:prstGeom>
+          <a:noFill/>
+        </p:spPr>
+        <p:txBody>
+          <a:bodyPr wrap="square" rtlCol="0">
+            <a:spAutoFit/>
+          </a:bodyPr>
+          <a:lstStyle/>
+          <a:p>
+            <a:pPr algn="ctr"/>
+            <a:r>
+              <a:rPr lang="en-US" sz="3600" dirty="0">
+                <a:solidFill>
+                  <a:schemeClr val="bg1">
+                    <a:lumMod val="95000"/>
+                    <a:lumOff val="5000"/>
+                  </a:schemeClr>
+                </a:solidFill>
+                <a:latin typeface="Arial" panose="020B0604020202020204" pitchFamily="34" charset="0"/>
+                <a:cs typeface="Arial" panose="020B0604020202020204" pitchFamily="34" charset="0"/>
+              </a:rPr>
+              <a:t>You may close your browser page now.</a:t>
+            </a:r>
+            <a:endParaRPr lang="en-GB" sz="3600" dirty="0">
+              <a:solidFill>
+                <a:schemeClr val="bg1">
+                  <a:lumMod val="95000"/>
+                  <a:lumOff val="5000"/>
+                </a:schemeClr>
+              </a:solidFill>
+              <a:latin typeface="Arial" panose="020B0604020202020204" pitchFamily="34" charset="0"/>
+              <a:cs typeface="Arial" panose="020B0604020202020204" pitchFamily="34" charset="0"/>
+            </a:endParaRPr>
+          </a:p>
+        </p:txBody>
+      </p:sp>
     </p:spTree>
     <p:extLst>
       <p:ext uri="{BB962C8B-B14F-4D97-AF65-F5344CB8AC3E}">
         <p14:creationId xmlns:p14="http://schemas.microsoft.com/office/powerpoint/2010/main" val="3293957011"/>
+      </p:ext>
+    </p:extLst>
+  </p:cSld>
+  <p:clrMapOvr>
+    <a:masterClrMapping/>
+  </p:clrMapOvr>
+</p:sld>
+</file>
+
+<file path=ppt/slides/slide19.xml><?xml version="1.0" encoding="utf-8"?>
+<p:sld xmlns:a="http://schemas.openxmlformats.org/drawingml/2006/main" xmlns:r="http://schemas.openxmlformats.org/officeDocument/2006/relationships" xmlns:p="http://schemas.openxmlformats.org/presentationml/2006/main">
+  <p:cSld>
+    <p:spTree>
+      <p:nvGrpSpPr>
+        <p:cNvPr id="1" name=""/>
+        <p:cNvGrpSpPr/>
+        <p:nvPr/>
+      </p:nvGrpSpPr>
+      <p:grpSpPr>
+        <a:xfrm>
+          <a:off x="0" y="0"/>
+          <a:ext cx="0" cy="0"/>
+          <a:chOff x="0" y="0"/>
+          <a:chExt cx="0" cy="0"/>
+        </a:xfrm>
+      </p:grpSpPr>
+      <p:sp>
+        <p:nvSpPr>
+          <p:cNvPr id="4" name="TextBox 3"/>
+          <p:cNvSpPr txBox="1"/>
+          <p:nvPr/>
+        </p:nvSpPr>
+        <p:spPr>
+          <a:xfrm>
+            <a:off x="2641824" y="6093296"/>
+            <a:ext cx="3860352" cy="954107"/>
+          </a:xfrm>
+          <a:prstGeom prst="rect">
+            <a:avLst/>
+          </a:prstGeom>
+          <a:noFill/>
+        </p:spPr>
+        <p:txBody>
+          <a:bodyPr wrap="none" rtlCol="0">
+            <a:spAutoFit/>
+          </a:bodyPr>
+          <a:lstStyle/>
+          <a:p>
+            <a:pPr>
+              <a:defRPr/>
+            </a:pPr>
+            <a:r>
+              <a:rPr lang="en-GB" sz="2800" dirty="0">
+                <a:solidFill>
+                  <a:schemeClr val="bg1">
+                    <a:lumMod val="95000"/>
+                    <a:lumOff val="5000"/>
+                  </a:schemeClr>
+                </a:solidFill>
+                <a:latin typeface="Arial" panose="020B0604020202020204" pitchFamily="34" charset="0"/>
+                <a:cs typeface="Arial" panose="020B0604020202020204" pitchFamily="34" charset="0"/>
+              </a:rPr>
+              <a:t>[Click Next to continue]</a:t>
+            </a:r>
+          </a:p>
+          <a:p>
+            <a:pPr marL="0" marR="0" lvl="0" indent="0" algn="l" defTabSz="914400" rtl="0" eaLnBrk="1" fontAlgn="auto" latinLnBrk="0" hangingPunct="1">
+              <a:lnSpc>
+                <a:spcPct val="100000"/>
+              </a:lnSpc>
+              <a:spcBef>
+                <a:spcPts val="0"/>
+              </a:spcBef>
+              <a:spcAft>
+                <a:spcPts val="0"/>
+              </a:spcAft>
+              <a:buClrTx/>
+              <a:buSzTx/>
+              <a:buFontTx/>
+              <a:buNone/>
+              <a:tabLst/>
+              <a:defRPr/>
+            </a:pPr>
+            <a:endParaRPr kumimoji="0" lang="en-GB" sz="2800" b="0" i="0" u="none" strike="noStrike" kern="1200" cap="none" spc="0" normalizeH="0" baseline="0" noProof="0" dirty="0">
+              <a:ln>
+                <a:noFill/>
+              </a:ln>
+              <a:solidFill>
+                <a:prstClr val="black">
+                  <a:lumMod val="95000"/>
+                  <a:lumOff val="5000"/>
+                </a:prstClr>
+              </a:solidFill>
+              <a:effectLst/>
+              <a:uLnTx/>
+              <a:uFillTx/>
+              <a:latin typeface="Arial" panose="020B0604020202020204" pitchFamily="34" charset="0"/>
+              <a:ea typeface="+mn-ea"/>
+              <a:cs typeface="Arial" panose="020B0604020202020204" pitchFamily="34" charset="0"/>
+            </a:endParaRPr>
+          </a:p>
+        </p:txBody>
+      </p:sp>
+      <p:sp>
+        <p:nvSpPr>
+          <p:cNvPr id="5" name="TextBox 4"/>
+          <p:cNvSpPr txBox="1"/>
+          <p:nvPr/>
+        </p:nvSpPr>
+        <p:spPr>
+          <a:xfrm>
+            <a:off x="489522" y="1124744"/>
+            <a:ext cx="8190305" cy="2031325"/>
+          </a:xfrm>
+          <a:prstGeom prst="rect">
+            <a:avLst/>
+          </a:prstGeom>
+          <a:noFill/>
+        </p:spPr>
+        <p:txBody>
+          <a:bodyPr wrap="square" rtlCol="0">
+            <a:spAutoFit/>
+          </a:bodyPr>
+          <a:lstStyle/>
+          <a:p>
+            <a:pPr marL="0" marR="0" lvl="0" indent="0" algn="ctr" defTabSz="914400" rtl="0" eaLnBrk="1" fontAlgn="auto" latinLnBrk="0" hangingPunct="1">
+              <a:lnSpc>
+                <a:spcPct val="100000"/>
+              </a:lnSpc>
+              <a:spcBef>
+                <a:spcPts val="0"/>
+              </a:spcBef>
+              <a:spcAft>
+                <a:spcPts val="0"/>
+              </a:spcAft>
+              <a:buClrTx/>
+              <a:buSzTx/>
+              <a:buFontTx/>
+              <a:buNone/>
+              <a:tabLst/>
+              <a:defRPr/>
+            </a:pPr>
+            <a:r>
+              <a:rPr kumimoji="0" lang="en-US" sz="1800" b="0" i="0" u="none" strike="noStrike" kern="1200" cap="none" spc="0" normalizeH="0" baseline="0" noProof="0" dirty="0">
+                <a:ln>
+                  <a:noFill/>
+                </a:ln>
+                <a:solidFill>
+                  <a:prstClr val="black">
+                    <a:lumMod val="95000"/>
+                    <a:lumOff val="5000"/>
+                  </a:prstClr>
+                </a:solidFill>
+                <a:effectLst/>
+                <a:uLnTx/>
+                <a:uFillTx/>
+                <a:latin typeface="Arial" panose="020B0604020202020204" pitchFamily="34" charset="0"/>
+                <a:ea typeface="+mn-ea"/>
+                <a:cs typeface="Arial" panose="020B0604020202020204" pitchFamily="34" charset="0"/>
+              </a:rPr>
+              <a:t>Now you will have the opportunity to practice the task with an advisor.</a:t>
+            </a:r>
+          </a:p>
+          <a:p>
+            <a:pPr marL="0" marR="0" lvl="0" indent="0" algn="ctr" defTabSz="914400" rtl="0" eaLnBrk="1" fontAlgn="auto" latinLnBrk="0" hangingPunct="1">
+              <a:lnSpc>
+                <a:spcPct val="100000"/>
+              </a:lnSpc>
+              <a:spcBef>
+                <a:spcPts val="0"/>
+              </a:spcBef>
+              <a:spcAft>
+                <a:spcPts val="0"/>
+              </a:spcAft>
+              <a:buClrTx/>
+              <a:buSzTx/>
+              <a:buFontTx/>
+              <a:buNone/>
+              <a:tabLst/>
+              <a:defRPr/>
+            </a:pPr>
+            <a:endParaRPr kumimoji="0" lang="en-US" sz="1800" b="0" i="0" u="none" strike="noStrike" kern="1200" cap="none" spc="0" normalizeH="0" baseline="0" noProof="0" dirty="0">
+              <a:ln>
+                <a:noFill/>
+              </a:ln>
+              <a:solidFill>
+                <a:prstClr val="black">
+                  <a:lumMod val="95000"/>
+                  <a:lumOff val="5000"/>
+                </a:prstClr>
+              </a:solidFill>
+              <a:effectLst/>
+              <a:uLnTx/>
+              <a:uFillTx/>
+              <a:latin typeface="Arial" panose="020B0604020202020204" pitchFamily="34" charset="0"/>
+              <a:ea typeface="+mn-ea"/>
+              <a:cs typeface="Arial" panose="020B0604020202020204" pitchFamily="34" charset="0"/>
+            </a:endParaRPr>
+          </a:p>
+          <a:p>
+            <a:pPr marL="0" marR="0" lvl="0" indent="0" algn="ctr" defTabSz="914400" rtl="0" eaLnBrk="1" fontAlgn="auto" latinLnBrk="0" hangingPunct="1">
+              <a:lnSpc>
+                <a:spcPct val="100000"/>
+              </a:lnSpc>
+              <a:spcBef>
+                <a:spcPts val="0"/>
+              </a:spcBef>
+              <a:spcAft>
+                <a:spcPts val="0"/>
+              </a:spcAft>
+              <a:buClrTx/>
+              <a:buSzTx/>
+              <a:buFontTx/>
+              <a:buNone/>
+              <a:tabLst/>
+              <a:defRPr/>
+            </a:pPr>
+            <a:r>
+              <a:rPr kumimoji="0" lang="en-US" sz="1800" b="0" i="0" u="none" strike="noStrike" kern="1200" cap="none" spc="0" normalizeH="0" baseline="0" noProof="0" dirty="0">
+                <a:ln>
+                  <a:noFill/>
+                </a:ln>
+                <a:solidFill>
+                  <a:prstClr val="black">
+                    <a:lumMod val="95000"/>
+                    <a:lumOff val="5000"/>
+                  </a:prstClr>
+                </a:solidFill>
+                <a:effectLst/>
+                <a:uLnTx/>
+                <a:uFillTx/>
+                <a:latin typeface="Arial" panose="020B0604020202020204" pitchFamily="34" charset="0"/>
+                <a:ea typeface="+mn-ea"/>
+                <a:cs typeface="Arial" panose="020B0604020202020204" pitchFamily="34" charset="0"/>
+              </a:rPr>
+              <a:t>On each trial you will get advice about the correct answer before you commit to a final choice.</a:t>
+            </a:r>
+          </a:p>
+          <a:p>
+            <a:pPr lvl="0" algn="ctr">
+              <a:defRPr/>
+            </a:pPr>
+            <a:endParaRPr lang="en-US" dirty="0">
+              <a:solidFill>
+                <a:prstClr val="black">
+                  <a:lumMod val="95000"/>
+                  <a:lumOff val="5000"/>
+                </a:prstClr>
+              </a:solidFill>
+              <a:latin typeface="Arial" panose="020B0604020202020204" pitchFamily="34" charset="0"/>
+              <a:cs typeface="Arial" panose="020B0604020202020204" pitchFamily="34" charset="0"/>
+            </a:endParaRPr>
+          </a:p>
+          <a:p>
+            <a:pPr lvl="0" algn="ctr">
+              <a:defRPr/>
+            </a:pPr>
+            <a:r>
+              <a:rPr lang="en-GB" dirty="0">
+                <a:solidFill>
+                  <a:prstClr val="black">
+                    <a:lumMod val="95000"/>
+                    <a:lumOff val="5000"/>
+                  </a:prstClr>
+                </a:solidFill>
+                <a:latin typeface="Arial" panose="020B0604020202020204" pitchFamily="34" charset="0"/>
+                <a:cs typeface="Arial" panose="020B0604020202020204" pitchFamily="34" charset="0"/>
+              </a:rPr>
+              <a:t>The advice will come either from a person or from a computer algorithm.  Each advisor will simply tell you which box they think has more dots.</a:t>
+            </a:r>
+            <a:endParaRPr lang="en-US" dirty="0">
+              <a:solidFill>
+                <a:prstClr val="black">
+                  <a:lumMod val="95000"/>
+                  <a:lumOff val="5000"/>
+                </a:prstClr>
+              </a:solidFill>
+              <a:latin typeface="Arial" panose="020B0604020202020204" pitchFamily="34" charset="0"/>
+              <a:cs typeface="Arial" panose="020B0604020202020204" pitchFamily="34" charset="0"/>
+            </a:endParaRPr>
+          </a:p>
+        </p:txBody>
+      </p:sp>
+      <p:sp>
+        <p:nvSpPr>
+          <p:cNvPr id="2" name="TextBox 1"/>
+          <p:cNvSpPr txBox="1"/>
+          <p:nvPr/>
+        </p:nvSpPr>
+        <p:spPr>
+          <a:xfrm>
+            <a:off x="3479757" y="476672"/>
+            <a:ext cx="2113656" cy="584775"/>
+          </a:xfrm>
+          <a:prstGeom prst="rect">
+            <a:avLst/>
+          </a:prstGeom>
+          <a:noFill/>
+        </p:spPr>
+        <p:txBody>
+          <a:bodyPr wrap="none" rtlCol="0">
+            <a:spAutoFit/>
+          </a:bodyPr>
+          <a:lstStyle/>
+          <a:p>
+            <a:pPr marL="0" marR="0" lvl="0" indent="0" algn="l" defTabSz="914400" rtl="0" eaLnBrk="1" fontAlgn="auto" latinLnBrk="0" hangingPunct="1">
+              <a:lnSpc>
+                <a:spcPct val="100000"/>
+              </a:lnSpc>
+              <a:spcBef>
+                <a:spcPts val="0"/>
+              </a:spcBef>
+              <a:spcAft>
+                <a:spcPts val="0"/>
+              </a:spcAft>
+              <a:buClrTx/>
+              <a:buSzTx/>
+              <a:buFontTx/>
+              <a:buNone/>
+              <a:tabLst/>
+              <a:defRPr/>
+            </a:pPr>
+            <a:r>
+              <a:rPr kumimoji="0" lang="en-US" sz="3200" b="0" i="0" u="none" strike="noStrike" kern="1200" cap="none" spc="0" normalizeH="0" baseline="0" noProof="0" dirty="0">
+                <a:ln>
+                  <a:noFill/>
+                </a:ln>
+                <a:solidFill>
+                  <a:srgbClr val="4F81BD">
+                    <a:lumMod val="50000"/>
+                  </a:srgbClr>
+                </a:solidFill>
+                <a:effectLst/>
+                <a:uLnTx/>
+                <a:uFillTx/>
+                <a:latin typeface="Arial" panose="020B0604020202020204" pitchFamily="34" charset="0"/>
+                <a:ea typeface="+mn-ea"/>
+                <a:cs typeface="Arial" panose="020B0604020202020204" pitchFamily="34" charset="0"/>
+              </a:rPr>
+              <a:t>Well done!</a:t>
+            </a:r>
+            <a:endParaRPr kumimoji="0" lang="en-GB" sz="3200" b="0" i="0" u="none" strike="noStrike" kern="1200" cap="none" spc="0" normalizeH="0" baseline="0" noProof="0" dirty="0">
+              <a:ln>
+                <a:noFill/>
+              </a:ln>
+              <a:solidFill>
+                <a:srgbClr val="4F81BD">
+                  <a:lumMod val="50000"/>
+                </a:srgbClr>
+              </a:solidFill>
+              <a:effectLst/>
+              <a:uLnTx/>
+              <a:uFillTx/>
+              <a:latin typeface="Arial" panose="020B0604020202020204" pitchFamily="34" charset="0"/>
+              <a:ea typeface="+mn-ea"/>
+              <a:cs typeface="Arial" panose="020B0604020202020204" pitchFamily="34" charset="0"/>
+            </a:endParaRPr>
+          </a:p>
+        </p:txBody>
+      </p:sp>
+      <p:pic>
+        <p:nvPicPr>
+          <p:cNvPr id="7" name="Picture 6">
+            <a:extLst>
+              <a:ext uri="{FF2B5EF4-FFF2-40B4-BE49-F238E27FC236}">
+                <a16:creationId xmlns:a16="http://schemas.microsoft.com/office/drawing/2014/main" id="{7CA7A4D2-0DD3-D943-9321-8BC045767294}"/>
+              </a:ext>
+            </a:extLst>
+          </p:cNvPr>
+          <p:cNvPicPr>
+            <a:picLocks noChangeAspect="1"/>
+          </p:cNvPicPr>
+          <p:nvPr/>
+        </p:nvPicPr>
+        <p:blipFill rotWithShape="1">
+          <a:blip r:embed="rId2">
+            <a:extLst>
+              <a:ext uri="{28A0092B-C50C-407E-A947-70E740481C1C}">
+                <a14:useLocalDpi xmlns:a14="http://schemas.microsoft.com/office/drawing/2010/main" val="0"/>
+              </a:ext>
+            </a:extLst>
+          </a:blip>
+          <a:srcRect l="1263" t="3037" r="1733" b="4008"/>
+          <a:stretch/>
+        </p:blipFill>
+        <p:spPr>
+          <a:xfrm>
+            <a:off x="236089" y="3671706"/>
+            <a:ext cx="4032449" cy="1125446"/>
+          </a:xfrm>
+          <a:prstGeom prst="rect">
+            <a:avLst/>
+          </a:prstGeom>
+        </p:spPr>
+      </p:pic>
+      <p:pic>
+        <p:nvPicPr>
+          <p:cNvPr id="8" name="Picture 7">
+            <a:extLst>
+              <a:ext uri="{FF2B5EF4-FFF2-40B4-BE49-F238E27FC236}">
+                <a16:creationId xmlns:a16="http://schemas.microsoft.com/office/drawing/2014/main" id="{D5546EB8-80EC-2146-85F8-66F29D2B2051}"/>
+              </a:ext>
+            </a:extLst>
+          </p:cNvPr>
+          <p:cNvPicPr>
+            <a:picLocks noChangeAspect="1"/>
+          </p:cNvPicPr>
+          <p:nvPr/>
+        </p:nvPicPr>
+        <p:blipFill rotWithShape="1">
+          <a:blip r:embed="rId3">
+            <a:extLst>
+              <a:ext uri="{28A0092B-C50C-407E-A947-70E740481C1C}">
+                <a14:useLocalDpi xmlns:a14="http://schemas.microsoft.com/office/drawing/2010/main" val="0"/>
+              </a:ext>
+            </a:extLst>
+          </a:blip>
+          <a:srcRect l="1674" t="5091" r="1241" b="7045"/>
+          <a:stretch/>
+        </p:blipFill>
+        <p:spPr>
+          <a:xfrm>
+            <a:off x="4499992" y="3671706"/>
+            <a:ext cx="4407919" cy="1122769"/>
+          </a:xfrm>
+          <a:prstGeom prst="rect">
+            <a:avLst/>
+          </a:prstGeom>
+        </p:spPr>
+      </p:pic>
+    </p:spTree>
+    <p:extLst>
+      <p:ext uri="{BB962C8B-B14F-4D97-AF65-F5344CB8AC3E}">
+        <p14:creationId xmlns:p14="http://schemas.microsoft.com/office/powerpoint/2010/main" val="608172390"/>
       </p:ext>
     </p:extLst>
   </p:cSld>
@@ -6262,6 +6735,1736 @@
     <p:extLst>
       <p:ext uri="{BB962C8B-B14F-4D97-AF65-F5344CB8AC3E}">
         <p14:creationId xmlns:p14="http://schemas.microsoft.com/office/powerpoint/2010/main" val="3089350362"/>
+      </p:ext>
+    </p:extLst>
+  </p:cSld>
+  <p:clrMapOvr>
+    <a:masterClrMapping/>
+  </p:clrMapOvr>
+</p:sld>
+</file>
+
+<file path=ppt/slides/slide20.xml><?xml version="1.0" encoding="utf-8"?>
+<p:sld xmlns:a="http://schemas.openxmlformats.org/drawingml/2006/main" xmlns:r="http://schemas.openxmlformats.org/officeDocument/2006/relationships" xmlns:p="http://schemas.openxmlformats.org/presentationml/2006/main">
+  <p:cSld>
+    <p:spTree>
+      <p:nvGrpSpPr>
+        <p:cNvPr id="1" name=""/>
+        <p:cNvGrpSpPr/>
+        <p:nvPr/>
+      </p:nvGrpSpPr>
+      <p:grpSpPr>
+        <a:xfrm>
+          <a:off x="0" y="0"/>
+          <a:ext cx="0" cy="0"/>
+          <a:chOff x="0" y="0"/>
+          <a:chExt cx="0" cy="0"/>
+        </a:xfrm>
+      </p:grpSpPr>
+      <p:sp>
+        <p:nvSpPr>
+          <p:cNvPr id="5" name="TextBox 4"/>
+          <p:cNvSpPr txBox="1"/>
+          <p:nvPr/>
+        </p:nvSpPr>
+        <p:spPr>
+          <a:xfrm>
+            <a:off x="323528" y="613132"/>
+            <a:ext cx="8424936" cy="5078313"/>
+          </a:xfrm>
+          <a:prstGeom prst="rect">
+            <a:avLst/>
+          </a:prstGeom>
+          <a:noFill/>
+        </p:spPr>
+        <p:txBody>
+          <a:bodyPr wrap="square" rtlCol="0">
+            <a:spAutoFit/>
+          </a:bodyPr>
+          <a:lstStyle/>
+          <a:p>
+            <a:pPr marL="0" marR="0" lvl="0" indent="0" defTabSz="914400" rtl="0" eaLnBrk="1" fontAlgn="auto" latinLnBrk="0" hangingPunct="1">
+              <a:lnSpc>
+                <a:spcPct val="100000"/>
+              </a:lnSpc>
+              <a:spcBef>
+                <a:spcPts val="0"/>
+              </a:spcBef>
+              <a:spcAft>
+                <a:spcPts val="0"/>
+              </a:spcAft>
+              <a:buClrTx/>
+              <a:buSzTx/>
+              <a:buFontTx/>
+              <a:buNone/>
+              <a:tabLst/>
+              <a:defRPr/>
+            </a:pPr>
+            <a:r>
+              <a:rPr kumimoji="0" lang="en-US" sz="1800" b="1" i="0" u="none" strike="noStrike" kern="1200" cap="none" spc="0" normalizeH="0" baseline="0" noProof="0" dirty="0">
+                <a:ln>
+                  <a:noFill/>
+                </a:ln>
+                <a:solidFill>
+                  <a:prstClr val="black">
+                    <a:lumMod val="95000"/>
+                    <a:lumOff val="5000"/>
+                  </a:prstClr>
+                </a:solidFill>
+                <a:effectLst/>
+                <a:uLnTx/>
+                <a:uFillTx/>
+                <a:latin typeface="Arial" panose="020B0604020202020204" pitchFamily="34" charset="0"/>
+                <a:ea typeface="+mn-ea"/>
+                <a:cs typeface="Arial" panose="020B0604020202020204" pitchFamily="34" charset="0"/>
+              </a:rPr>
+              <a:t>Before you begin:</a:t>
+            </a:r>
+          </a:p>
+          <a:p>
+            <a:pPr marL="0" marR="0" lvl="0" indent="0" defTabSz="914400" rtl="0" eaLnBrk="1" fontAlgn="auto" latinLnBrk="0" hangingPunct="1">
+              <a:lnSpc>
+                <a:spcPct val="100000"/>
+              </a:lnSpc>
+              <a:spcBef>
+                <a:spcPts val="0"/>
+              </a:spcBef>
+              <a:spcAft>
+                <a:spcPts val="0"/>
+              </a:spcAft>
+              <a:buClrTx/>
+              <a:buSzTx/>
+              <a:buFontTx/>
+              <a:buNone/>
+              <a:tabLst/>
+              <a:defRPr/>
+            </a:pPr>
+            <a:endParaRPr kumimoji="0" lang="en-US" sz="1800" b="1" i="0" u="none" strike="noStrike" kern="1200" cap="none" spc="0" normalizeH="0" baseline="0" noProof="0" dirty="0">
+              <a:ln>
+                <a:noFill/>
+              </a:ln>
+              <a:solidFill>
+                <a:prstClr val="black">
+                  <a:lumMod val="95000"/>
+                  <a:lumOff val="5000"/>
+                </a:prstClr>
+              </a:solidFill>
+              <a:effectLst/>
+              <a:uLnTx/>
+              <a:uFillTx/>
+              <a:latin typeface="Arial" panose="020B0604020202020204" pitchFamily="34" charset="0"/>
+              <a:ea typeface="+mn-ea"/>
+              <a:cs typeface="Arial" panose="020B0604020202020204" pitchFamily="34" charset="0"/>
+            </a:endParaRPr>
+          </a:p>
+          <a:p>
+            <a:pPr marL="285750" marR="0" lvl="0" indent="-285750" defTabSz="914400" rtl="0" eaLnBrk="1" fontAlgn="auto" latinLnBrk="0" hangingPunct="1">
+              <a:lnSpc>
+                <a:spcPct val="100000"/>
+              </a:lnSpc>
+              <a:spcBef>
+                <a:spcPts val="0"/>
+              </a:spcBef>
+              <a:spcAft>
+                <a:spcPts val="0"/>
+              </a:spcAft>
+              <a:buClrTx/>
+              <a:buSzTx/>
+              <a:buFont typeface="Arial" panose="020B0604020202020204" pitchFamily="34" charset="0"/>
+              <a:buChar char="•"/>
+              <a:tabLst/>
+              <a:defRPr/>
+            </a:pPr>
+            <a:r>
+              <a:rPr kumimoji="0" lang="en-GB" b="0" i="0" u="none" strike="noStrike" kern="1200" cap="none" spc="0" normalizeH="0" baseline="0" noProof="0" dirty="0">
+                <a:ln>
+                  <a:noFill/>
+                </a:ln>
+                <a:solidFill>
+                  <a:prstClr val="black">
+                    <a:lumMod val="95000"/>
+                    <a:lumOff val="5000"/>
+                  </a:prstClr>
+                </a:solidFill>
+                <a:effectLst/>
+                <a:uLnTx/>
+                <a:uFillTx/>
+                <a:latin typeface="Arial" panose="020B0604020202020204" pitchFamily="34" charset="0"/>
+                <a:cs typeface="Arial" panose="020B0604020202020204" pitchFamily="34" charset="0"/>
+              </a:rPr>
+              <a:t>On every trial, you will </a:t>
+            </a:r>
+            <a:r>
+              <a:rPr lang="en-GB" dirty="0">
+                <a:solidFill>
+                  <a:prstClr val="black">
+                    <a:lumMod val="95000"/>
+                    <a:lumOff val="5000"/>
+                  </a:prstClr>
+                </a:solidFill>
+                <a:latin typeface="Arial" panose="020B0604020202020204" pitchFamily="34" charset="0"/>
+                <a:cs typeface="Arial" panose="020B0604020202020204" pitchFamily="34" charset="0"/>
+              </a:rPr>
+              <a:t>receive </a:t>
+            </a:r>
+            <a:r>
+              <a:rPr kumimoji="0" lang="en-GB" b="0" i="0" u="none" strike="noStrike" kern="1200" cap="none" spc="0" normalizeH="0" baseline="0" noProof="0" dirty="0">
+                <a:ln>
+                  <a:noFill/>
+                </a:ln>
+                <a:solidFill>
+                  <a:prstClr val="black">
+                    <a:lumMod val="95000"/>
+                    <a:lumOff val="5000"/>
+                  </a:prstClr>
+                </a:solidFill>
+                <a:effectLst/>
+                <a:uLnTx/>
+                <a:uFillTx/>
+                <a:latin typeface="Arial" panose="020B0604020202020204" pitchFamily="34" charset="0"/>
+                <a:cs typeface="Arial" panose="020B0604020202020204" pitchFamily="34" charset="0"/>
+              </a:rPr>
+              <a:t>only one choice of advisor: either the computer or human.</a:t>
+            </a:r>
+          </a:p>
+          <a:p>
+            <a:pPr marL="285750" marR="0" lvl="0" indent="-285750" defTabSz="914400" rtl="0" eaLnBrk="1" fontAlgn="auto" latinLnBrk="0" hangingPunct="1">
+              <a:lnSpc>
+                <a:spcPct val="100000"/>
+              </a:lnSpc>
+              <a:spcBef>
+                <a:spcPts val="0"/>
+              </a:spcBef>
+              <a:spcAft>
+                <a:spcPts val="0"/>
+              </a:spcAft>
+              <a:buClrTx/>
+              <a:buSzTx/>
+              <a:buFont typeface="Arial" panose="020B0604020202020204" pitchFamily="34" charset="0"/>
+              <a:buChar char="•"/>
+              <a:tabLst/>
+              <a:defRPr/>
+            </a:pPr>
+            <a:endParaRPr kumimoji="0" lang="en-GB" b="1" i="0" u="none" strike="noStrike" kern="1200" cap="none" spc="0" normalizeH="0" baseline="0" noProof="0" dirty="0">
+              <a:ln>
+                <a:noFill/>
+              </a:ln>
+              <a:solidFill>
+                <a:prstClr val="black">
+                  <a:lumMod val="95000"/>
+                  <a:lumOff val="5000"/>
+                </a:prstClr>
+              </a:solidFill>
+              <a:effectLst/>
+              <a:uLnTx/>
+              <a:uFillTx/>
+              <a:latin typeface="Arial" panose="020B0604020202020204" pitchFamily="34" charset="0"/>
+              <a:cs typeface="Arial" panose="020B0604020202020204" pitchFamily="34" charset="0"/>
+            </a:endParaRPr>
+          </a:p>
+          <a:p>
+            <a:pPr marL="285750" indent="-285750">
+              <a:buFont typeface="Arial" panose="020B0604020202020204" pitchFamily="34" charset="0"/>
+              <a:buChar char="•"/>
+            </a:pPr>
+            <a:r>
+              <a:rPr lang="en-GB" dirty="0">
+                <a:solidFill>
+                  <a:schemeClr val="bg1">
+                    <a:lumMod val="95000"/>
+                    <a:lumOff val="5000"/>
+                  </a:schemeClr>
+                </a:solidFill>
+                <a:latin typeface="Arial" panose="020B0604020202020204" pitchFamily="34" charset="0"/>
+                <a:cs typeface="Arial" panose="020B0604020202020204" pitchFamily="34" charset="0"/>
+              </a:rPr>
+              <a:t>When the HUMAN is your advisor:</a:t>
+            </a:r>
+          </a:p>
+          <a:p>
+            <a:pPr marL="742950" lvl="1" indent="-285750">
+              <a:buFont typeface="Arial" panose="020B0604020202020204" pitchFamily="34" charset="0"/>
+              <a:buChar char="•"/>
+            </a:pPr>
+            <a:r>
+              <a:rPr lang="en-GB" dirty="0">
+                <a:solidFill>
+                  <a:schemeClr val="bg1">
+                    <a:lumMod val="95000"/>
+                    <a:lumOff val="5000"/>
+                  </a:schemeClr>
+                </a:solidFill>
+                <a:latin typeface="Arial" panose="020B0604020202020204" pitchFamily="34" charset="0"/>
+                <a:cs typeface="Arial" panose="020B0604020202020204" pitchFamily="34" charset="0"/>
+              </a:rPr>
+              <a:t>You will be told the answer (LEFT/RIGHT) chosen by a real person who did the task earlier and saw the exact same stimulus that you just saw.</a:t>
+            </a:r>
+          </a:p>
+          <a:p>
+            <a:pPr marL="742950" lvl="1" indent="-285750">
+              <a:buFont typeface="Arial" panose="020B0604020202020204" pitchFamily="34" charset="0"/>
+              <a:buChar char="•"/>
+            </a:pPr>
+            <a:r>
+              <a:rPr lang="en-GB" dirty="0">
+                <a:solidFill>
+                  <a:schemeClr val="bg1">
+                    <a:lumMod val="95000"/>
+                    <a:lumOff val="5000"/>
+                  </a:schemeClr>
+                </a:solidFill>
+                <a:latin typeface="Arial" panose="020B0604020202020204" pitchFamily="34" charset="0"/>
+                <a:cs typeface="Arial" panose="020B0604020202020204" pitchFamily="34" charset="0"/>
+              </a:rPr>
+              <a:t>The HUMAN advisor is a past participant who completed the study without the assistance of advisors.  </a:t>
+            </a:r>
+          </a:p>
+          <a:p>
+            <a:pPr marL="285750" indent="-285750">
+              <a:buFont typeface="Arial" panose="020B0604020202020204" pitchFamily="34" charset="0"/>
+              <a:buChar char="•"/>
+            </a:pPr>
+            <a:endParaRPr lang="en-GB" dirty="0">
+              <a:solidFill>
+                <a:schemeClr val="bg1">
+                  <a:lumMod val="95000"/>
+                  <a:lumOff val="5000"/>
+                </a:schemeClr>
+              </a:solidFill>
+              <a:latin typeface="Arial" panose="020B0604020202020204" pitchFamily="34" charset="0"/>
+              <a:cs typeface="Arial" panose="020B0604020202020204" pitchFamily="34" charset="0"/>
+            </a:endParaRPr>
+          </a:p>
+          <a:p>
+            <a:pPr marL="285750" indent="-285750">
+              <a:buFont typeface="Arial" panose="020B0604020202020204" pitchFamily="34" charset="0"/>
+              <a:buChar char="•"/>
+            </a:pPr>
+            <a:r>
+              <a:rPr lang="en-GB" dirty="0">
+                <a:solidFill>
+                  <a:schemeClr val="bg1">
+                    <a:lumMod val="95000"/>
+                    <a:lumOff val="5000"/>
+                  </a:schemeClr>
+                </a:solidFill>
+                <a:latin typeface="Arial" panose="020B0604020202020204" pitchFamily="34" charset="0"/>
+                <a:cs typeface="Arial" panose="020B0604020202020204" pitchFamily="34" charset="0"/>
+              </a:rPr>
+              <a:t>When the COMPUTER is your advisor:</a:t>
+            </a:r>
+          </a:p>
+          <a:p>
+            <a:pPr marL="742950" lvl="1" indent="-285750">
+              <a:buFont typeface="Arial" panose="020B0604020202020204" pitchFamily="34" charset="0"/>
+              <a:buChar char="•"/>
+            </a:pPr>
+            <a:r>
+              <a:rPr lang="en-GB" dirty="0">
+                <a:solidFill>
+                  <a:schemeClr val="bg1">
+                    <a:lumMod val="95000"/>
+                    <a:lumOff val="5000"/>
+                  </a:schemeClr>
+                </a:solidFill>
+                <a:latin typeface="Arial" panose="020B0604020202020204" pitchFamily="34" charset="0"/>
+                <a:cs typeface="Arial" panose="020B0604020202020204" pitchFamily="34" charset="0"/>
+              </a:rPr>
+              <a:t>You will be told the answer (LEFT/RIGHT) chosen by a computer algorithm that is applied to the exact same stimulus that you just saw.</a:t>
+            </a:r>
+          </a:p>
+          <a:p>
+            <a:pPr marL="742950" lvl="1" indent="-285750">
+              <a:buFont typeface="Arial" panose="020B0604020202020204" pitchFamily="34" charset="0"/>
+              <a:buChar char="•"/>
+            </a:pPr>
+            <a:r>
+              <a:rPr lang="en-GB" dirty="0">
+                <a:solidFill>
+                  <a:schemeClr val="bg1">
+                    <a:lumMod val="95000"/>
+                    <a:lumOff val="5000"/>
+                  </a:schemeClr>
+                </a:solidFill>
+                <a:latin typeface="Arial" panose="020B0604020202020204" pitchFamily="34" charset="0"/>
+                <a:cs typeface="Arial" panose="020B0604020202020204" pitchFamily="34" charset="0"/>
+              </a:rPr>
+              <a:t>The COMPUTER advisor consists of an </a:t>
+            </a:r>
+            <a:r>
+              <a:rPr lang="en-GB">
+                <a:solidFill>
+                  <a:schemeClr val="bg1">
+                    <a:lumMod val="95000"/>
+                    <a:lumOff val="5000"/>
+                  </a:schemeClr>
+                </a:solidFill>
+                <a:latin typeface="Arial" panose="020B0604020202020204" pitchFamily="34" charset="0"/>
+                <a:cs typeface="Arial" panose="020B0604020202020204" pitchFamily="34" charset="0"/>
+              </a:rPr>
+              <a:t>algorithm that analyses </a:t>
+            </a:r>
+            <a:r>
+              <a:rPr lang="en-GB" dirty="0">
+                <a:solidFill>
+                  <a:schemeClr val="bg1">
+                    <a:lumMod val="95000"/>
+                    <a:lumOff val="5000"/>
+                  </a:schemeClr>
+                </a:solidFill>
+                <a:latin typeface="Arial" panose="020B0604020202020204" pitchFamily="34" charset="0"/>
+                <a:cs typeface="Arial" panose="020B0604020202020204" pitchFamily="34" charset="0"/>
+              </a:rPr>
+              <a:t>the given stimulus and produces an answer based on pre-determined criteria.</a:t>
+            </a:r>
+          </a:p>
+          <a:p>
+            <a:pPr marR="0" lvl="0" defTabSz="914400" rtl="0" eaLnBrk="1" fontAlgn="auto" latinLnBrk="0" hangingPunct="1">
+              <a:lnSpc>
+                <a:spcPct val="100000"/>
+              </a:lnSpc>
+              <a:spcBef>
+                <a:spcPts val="0"/>
+              </a:spcBef>
+              <a:spcAft>
+                <a:spcPts val="0"/>
+              </a:spcAft>
+              <a:buClrTx/>
+              <a:buSzTx/>
+              <a:tabLst/>
+              <a:defRPr/>
+            </a:pPr>
+            <a:endParaRPr kumimoji="0" lang="en-GB" b="0" i="0" u="none" strike="noStrike" kern="1200" cap="none" spc="0" normalizeH="0" baseline="0" noProof="0" dirty="0">
+              <a:ln>
+                <a:noFill/>
+              </a:ln>
+              <a:solidFill>
+                <a:prstClr val="black">
+                  <a:lumMod val="95000"/>
+                  <a:lumOff val="5000"/>
+                </a:prstClr>
+              </a:solidFill>
+              <a:effectLst/>
+              <a:uLnTx/>
+              <a:uFillTx/>
+              <a:latin typeface="Arial" panose="020B0604020202020204" pitchFamily="34" charset="0"/>
+              <a:cs typeface="Arial" panose="020B0604020202020204" pitchFamily="34" charset="0"/>
+            </a:endParaRPr>
+          </a:p>
+          <a:p>
+            <a:pPr marL="0" marR="0" lvl="0" indent="0" defTabSz="914400" rtl="0" eaLnBrk="1" fontAlgn="auto" latinLnBrk="0" hangingPunct="1">
+              <a:lnSpc>
+                <a:spcPct val="100000"/>
+              </a:lnSpc>
+              <a:spcBef>
+                <a:spcPts val="0"/>
+              </a:spcBef>
+              <a:spcAft>
+                <a:spcPts val="0"/>
+              </a:spcAft>
+              <a:buClrTx/>
+              <a:buSzTx/>
+              <a:buFontTx/>
+              <a:buNone/>
+              <a:tabLst/>
+              <a:defRPr/>
+            </a:pPr>
+            <a:endParaRPr kumimoji="0" lang="en-GB" b="0" i="0" u="none" strike="noStrike" kern="1200" cap="none" spc="0" normalizeH="0" baseline="0" noProof="0" dirty="0">
+              <a:ln>
+                <a:noFill/>
+              </a:ln>
+              <a:solidFill>
+                <a:prstClr val="black">
+                  <a:lumMod val="95000"/>
+                  <a:lumOff val="5000"/>
+                </a:prstClr>
+              </a:solidFill>
+              <a:effectLst/>
+              <a:uLnTx/>
+              <a:uFillTx/>
+              <a:latin typeface="Arial" panose="020B0604020202020204" pitchFamily="34" charset="0"/>
+              <a:cs typeface="Arial" panose="020B0604020202020204" pitchFamily="34" charset="0"/>
+            </a:endParaRPr>
+          </a:p>
+        </p:txBody>
+      </p:sp>
+      <p:sp>
+        <p:nvSpPr>
+          <p:cNvPr id="6" name="TextBox 5">
+            <a:extLst>
+              <a:ext uri="{FF2B5EF4-FFF2-40B4-BE49-F238E27FC236}">
+                <a16:creationId xmlns:a16="http://schemas.microsoft.com/office/drawing/2014/main" id="{8D0C8D80-8C11-ED45-8BFD-61C6F0D66AAA}"/>
+              </a:ext>
+            </a:extLst>
+          </p:cNvPr>
+          <p:cNvSpPr txBox="1"/>
+          <p:nvPr/>
+        </p:nvSpPr>
+        <p:spPr>
+          <a:xfrm>
+            <a:off x="2641824" y="6093296"/>
+            <a:ext cx="3860352" cy="954107"/>
+          </a:xfrm>
+          <a:prstGeom prst="rect">
+            <a:avLst/>
+          </a:prstGeom>
+          <a:noFill/>
+        </p:spPr>
+        <p:txBody>
+          <a:bodyPr wrap="none" rtlCol="0">
+            <a:spAutoFit/>
+          </a:bodyPr>
+          <a:lstStyle/>
+          <a:p>
+            <a:pPr>
+              <a:defRPr/>
+            </a:pPr>
+            <a:r>
+              <a:rPr lang="en-GB" sz="2800" dirty="0">
+                <a:solidFill>
+                  <a:schemeClr val="bg1">
+                    <a:lumMod val="95000"/>
+                    <a:lumOff val="5000"/>
+                  </a:schemeClr>
+                </a:solidFill>
+                <a:latin typeface="Arial" panose="020B0604020202020204" pitchFamily="34" charset="0"/>
+                <a:cs typeface="Arial" panose="020B0604020202020204" pitchFamily="34" charset="0"/>
+              </a:rPr>
+              <a:t>[Click Next to continue]</a:t>
+            </a:r>
+          </a:p>
+          <a:p>
+            <a:pPr marL="0" marR="0" lvl="0" indent="0" algn="l" defTabSz="914400" rtl="0" eaLnBrk="1" fontAlgn="auto" latinLnBrk="0" hangingPunct="1">
+              <a:lnSpc>
+                <a:spcPct val="100000"/>
+              </a:lnSpc>
+              <a:spcBef>
+                <a:spcPts val="0"/>
+              </a:spcBef>
+              <a:spcAft>
+                <a:spcPts val="0"/>
+              </a:spcAft>
+              <a:buClrTx/>
+              <a:buSzTx/>
+              <a:buFontTx/>
+              <a:buNone/>
+              <a:tabLst/>
+              <a:defRPr/>
+            </a:pPr>
+            <a:endParaRPr kumimoji="0" lang="en-GB" sz="2800" b="0" i="0" u="none" strike="noStrike" kern="1200" cap="none" spc="0" normalizeH="0" baseline="0" noProof="0" dirty="0">
+              <a:ln>
+                <a:noFill/>
+              </a:ln>
+              <a:solidFill>
+                <a:prstClr val="black">
+                  <a:lumMod val="95000"/>
+                  <a:lumOff val="5000"/>
+                </a:prstClr>
+              </a:solidFill>
+              <a:effectLst/>
+              <a:uLnTx/>
+              <a:uFillTx/>
+              <a:latin typeface="Arial" panose="020B0604020202020204" pitchFamily="34" charset="0"/>
+              <a:ea typeface="+mn-ea"/>
+              <a:cs typeface="Arial" panose="020B0604020202020204" pitchFamily="34" charset="0"/>
+            </a:endParaRPr>
+          </a:p>
+        </p:txBody>
+      </p:sp>
+    </p:spTree>
+    <p:extLst>
+      <p:ext uri="{BB962C8B-B14F-4D97-AF65-F5344CB8AC3E}">
+        <p14:creationId xmlns:p14="http://schemas.microsoft.com/office/powerpoint/2010/main" val="3760295760"/>
+      </p:ext>
+    </p:extLst>
+  </p:cSld>
+  <p:clrMapOvr>
+    <a:masterClrMapping/>
+  </p:clrMapOvr>
+</p:sld>
+</file>
+
+<file path=ppt/slides/slide21.xml><?xml version="1.0" encoding="utf-8"?>
+<p:sld xmlns:a="http://schemas.openxmlformats.org/drawingml/2006/main" xmlns:r="http://schemas.openxmlformats.org/officeDocument/2006/relationships" xmlns:p="http://schemas.openxmlformats.org/presentationml/2006/main">
+  <p:cSld>
+    <p:spTree>
+      <p:nvGrpSpPr>
+        <p:cNvPr id="1" name=""/>
+        <p:cNvGrpSpPr/>
+        <p:nvPr/>
+      </p:nvGrpSpPr>
+      <p:grpSpPr>
+        <a:xfrm>
+          <a:off x="0" y="0"/>
+          <a:ext cx="0" cy="0"/>
+          <a:chOff x="0" y="0"/>
+          <a:chExt cx="0" cy="0"/>
+        </a:xfrm>
+      </p:grpSpPr>
+      <p:sp>
+        <p:nvSpPr>
+          <p:cNvPr id="5" name="TextBox 4"/>
+          <p:cNvSpPr txBox="1"/>
+          <p:nvPr/>
+        </p:nvSpPr>
+        <p:spPr>
+          <a:xfrm>
+            <a:off x="395536" y="548680"/>
+            <a:ext cx="8424936" cy="5909310"/>
+          </a:xfrm>
+          <a:prstGeom prst="rect">
+            <a:avLst/>
+          </a:prstGeom>
+          <a:noFill/>
+        </p:spPr>
+        <p:txBody>
+          <a:bodyPr wrap="square" rtlCol="0">
+            <a:spAutoFit/>
+          </a:bodyPr>
+          <a:lstStyle/>
+          <a:p>
+            <a:pPr marL="285750" indent="-285750">
+              <a:buFont typeface="Arial" panose="020B0604020202020204" pitchFamily="34" charset="0"/>
+              <a:buChar char="•"/>
+            </a:pPr>
+            <a:r>
+              <a:rPr lang="en-GB" dirty="0">
+                <a:solidFill>
+                  <a:prstClr val="black">
+                    <a:lumMod val="95000"/>
+                    <a:lumOff val="5000"/>
+                  </a:prstClr>
+                </a:solidFill>
+                <a:latin typeface="Arial" panose="020B0604020202020204" pitchFamily="34" charset="0"/>
+                <a:cs typeface="Arial" panose="020B0604020202020204" pitchFamily="34" charset="0"/>
+              </a:rPr>
+              <a:t>Your advisors may sometimes be incorrect.  The advice will ALWAYS come from the same person and same computer algorithm across the whole experiment, so you can learn how reliable each source of advice is.</a:t>
+            </a:r>
+          </a:p>
+          <a:p>
+            <a:r>
+              <a:rPr lang="en-GB" dirty="0">
+                <a:solidFill>
+                  <a:prstClr val="black">
+                    <a:lumMod val="95000"/>
+                    <a:lumOff val="5000"/>
+                  </a:prstClr>
+                </a:solidFill>
+                <a:latin typeface="Arial" panose="020B0604020202020204" pitchFamily="34" charset="0"/>
+                <a:cs typeface="Arial" panose="020B0604020202020204" pitchFamily="34" charset="0"/>
+              </a:rPr>
+              <a:t>  </a:t>
+            </a:r>
+          </a:p>
+          <a:p>
+            <a:pPr marL="285750" marR="0" lvl="0" indent="-285750" defTabSz="914400" rtl="0" eaLnBrk="1" fontAlgn="auto" latinLnBrk="0" hangingPunct="1">
+              <a:lnSpc>
+                <a:spcPct val="100000"/>
+              </a:lnSpc>
+              <a:spcBef>
+                <a:spcPts val="0"/>
+              </a:spcBef>
+              <a:spcAft>
+                <a:spcPts val="0"/>
+              </a:spcAft>
+              <a:buClrTx/>
+              <a:buSzTx/>
+              <a:buFont typeface="Arial" panose="020B0604020202020204" pitchFamily="34" charset="0"/>
+              <a:buChar char="•"/>
+              <a:tabLst/>
+              <a:defRPr/>
+            </a:pPr>
+            <a:r>
+              <a:rPr kumimoji="0" lang="en-GB" sz="1800" b="0" i="0" u="none" strike="noStrike" kern="1200" cap="none" spc="0" normalizeH="0" baseline="0" noProof="0" dirty="0">
+                <a:ln>
+                  <a:noFill/>
+                </a:ln>
+                <a:solidFill>
+                  <a:prstClr val="black">
+                    <a:lumMod val="95000"/>
+                    <a:lumOff val="5000"/>
+                  </a:prstClr>
+                </a:solidFill>
+                <a:effectLst/>
+                <a:uLnTx/>
+                <a:uFillTx/>
+                <a:latin typeface="Arial" panose="020B0604020202020204" pitchFamily="34" charset="0"/>
+                <a:ea typeface="+mn-ea"/>
+                <a:cs typeface="Arial" panose="020B0604020202020204" pitchFamily="34" charset="0"/>
+              </a:rPr>
+              <a:t>Each trial will start with two boxes of dots, just as you practiced at the start of the experiment.  Then you’ll be asked for an initial judgment of which box contained more dots, and how confident you are in your judgment.</a:t>
+            </a:r>
+          </a:p>
+          <a:p>
+            <a:pPr marL="285750" marR="0" lvl="0" indent="-285750" defTabSz="914400" rtl="0" eaLnBrk="1" fontAlgn="auto" latinLnBrk="0" hangingPunct="1">
+              <a:lnSpc>
+                <a:spcPct val="100000"/>
+              </a:lnSpc>
+              <a:spcBef>
+                <a:spcPts val="0"/>
+              </a:spcBef>
+              <a:spcAft>
+                <a:spcPts val="0"/>
+              </a:spcAft>
+              <a:buClrTx/>
+              <a:buSzTx/>
+              <a:buFont typeface="Arial" panose="020B0604020202020204" pitchFamily="34" charset="0"/>
+              <a:buChar char="•"/>
+              <a:tabLst/>
+              <a:defRPr/>
+            </a:pPr>
+            <a:endParaRPr kumimoji="0" lang="en-GB" sz="1800" b="0" i="0" u="none" strike="noStrike" kern="1200" cap="none" spc="0" normalizeH="0" baseline="0" noProof="0" dirty="0">
+              <a:ln>
+                <a:noFill/>
+              </a:ln>
+              <a:solidFill>
+                <a:prstClr val="black">
+                  <a:lumMod val="95000"/>
+                  <a:lumOff val="5000"/>
+                </a:prstClr>
+              </a:solidFill>
+              <a:effectLst/>
+              <a:uLnTx/>
+              <a:uFillTx/>
+              <a:latin typeface="Arial" panose="020B0604020202020204" pitchFamily="34" charset="0"/>
+              <a:ea typeface="+mn-ea"/>
+              <a:cs typeface="Arial" panose="020B0604020202020204" pitchFamily="34" charset="0"/>
+            </a:endParaRPr>
+          </a:p>
+          <a:p>
+            <a:pPr marL="285750" marR="0" lvl="0" indent="-285750" defTabSz="914400" rtl="0" eaLnBrk="1" fontAlgn="auto" latinLnBrk="0" hangingPunct="1">
+              <a:lnSpc>
+                <a:spcPct val="100000"/>
+              </a:lnSpc>
+              <a:spcBef>
+                <a:spcPts val="0"/>
+              </a:spcBef>
+              <a:spcAft>
+                <a:spcPts val="0"/>
+              </a:spcAft>
+              <a:buClrTx/>
+              <a:buSzTx/>
+              <a:buFont typeface="Arial" panose="020B0604020202020204" pitchFamily="34" charset="0"/>
+              <a:buChar char="•"/>
+              <a:tabLst/>
+              <a:defRPr/>
+            </a:pPr>
+            <a:r>
+              <a:rPr kumimoji="0" lang="en-GB" sz="1800" b="0" i="0" u="none" strike="noStrike" kern="1200" cap="none" spc="0" normalizeH="0" baseline="0" noProof="0" dirty="0">
+                <a:ln>
+                  <a:noFill/>
+                </a:ln>
+                <a:solidFill>
+                  <a:prstClr val="black">
+                    <a:lumMod val="95000"/>
+                    <a:lumOff val="5000"/>
+                  </a:prstClr>
+                </a:solidFill>
+                <a:effectLst/>
+                <a:uLnTx/>
+                <a:uFillTx/>
+                <a:latin typeface="Arial" panose="020B0604020202020204" pitchFamily="34" charset="0"/>
+                <a:ea typeface="+mn-ea"/>
+                <a:cs typeface="Arial" panose="020B0604020202020204" pitchFamily="34" charset="0"/>
+              </a:rPr>
+              <a:t>Then you’ll be given either computer or human advice.  Remember: the advice always comes from the same person and the same algorithm.  Use the mouse to click on the advisor when</a:t>
+            </a:r>
+            <a:r>
+              <a:rPr kumimoji="0" lang="en-GB" sz="1800" b="0" i="0" u="none" strike="noStrike" kern="1200" cap="none" spc="0" normalizeH="0" noProof="0" dirty="0">
+                <a:ln>
+                  <a:noFill/>
+                </a:ln>
+                <a:solidFill>
+                  <a:prstClr val="black">
+                    <a:lumMod val="95000"/>
+                    <a:lumOff val="5000"/>
+                  </a:prstClr>
+                </a:solidFill>
+                <a:effectLst/>
+                <a:uLnTx/>
+                <a:uFillTx/>
+                <a:latin typeface="Arial" panose="020B0604020202020204" pitchFamily="34" charset="0"/>
+                <a:ea typeface="+mn-ea"/>
+                <a:cs typeface="Arial" panose="020B0604020202020204" pitchFamily="34" charset="0"/>
+              </a:rPr>
+              <a:t> you are ready to see their advice</a:t>
+            </a:r>
+            <a:r>
+              <a:rPr kumimoji="0" lang="en-GB" sz="1800" b="0" i="0" u="none" strike="noStrike" kern="1200" cap="none" spc="0" normalizeH="0" baseline="0" noProof="0" dirty="0">
+                <a:ln>
+                  <a:noFill/>
+                </a:ln>
+                <a:solidFill>
+                  <a:prstClr val="black">
+                    <a:lumMod val="95000"/>
+                    <a:lumOff val="5000"/>
+                  </a:prstClr>
+                </a:solidFill>
+                <a:effectLst/>
+                <a:uLnTx/>
+                <a:uFillTx/>
+                <a:latin typeface="Arial" panose="020B0604020202020204" pitchFamily="34" charset="0"/>
+                <a:ea typeface="+mn-ea"/>
+                <a:cs typeface="Arial" panose="020B0604020202020204" pitchFamily="34" charset="0"/>
+              </a:rPr>
+              <a:t>.</a:t>
+            </a:r>
+          </a:p>
+          <a:p>
+            <a:pPr marL="285750" marR="0" lvl="0" indent="-285750" defTabSz="914400" rtl="0" eaLnBrk="1" fontAlgn="auto" latinLnBrk="0" hangingPunct="1">
+              <a:lnSpc>
+                <a:spcPct val="100000"/>
+              </a:lnSpc>
+              <a:spcBef>
+                <a:spcPts val="0"/>
+              </a:spcBef>
+              <a:spcAft>
+                <a:spcPts val="0"/>
+              </a:spcAft>
+              <a:buClrTx/>
+              <a:buSzTx/>
+              <a:buFont typeface="Arial" panose="020B0604020202020204" pitchFamily="34" charset="0"/>
+              <a:buChar char="•"/>
+              <a:tabLst/>
+              <a:defRPr/>
+            </a:pPr>
+            <a:endParaRPr lang="en-GB" dirty="0">
+              <a:solidFill>
+                <a:prstClr val="black">
+                  <a:lumMod val="95000"/>
+                  <a:lumOff val="5000"/>
+                </a:prstClr>
+              </a:solidFill>
+              <a:latin typeface="Arial" panose="020B0604020202020204" pitchFamily="34" charset="0"/>
+              <a:cs typeface="Arial" panose="020B0604020202020204" pitchFamily="34" charset="0"/>
+            </a:endParaRPr>
+          </a:p>
+          <a:p>
+            <a:pPr marL="285750" lvl="0" indent="-285750">
+              <a:buFont typeface="Arial" panose="020B0604020202020204" pitchFamily="34" charset="0"/>
+              <a:buChar char="•"/>
+              <a:defRPr/>
+            </a:pPr>
+            <a:r>
+              <a:rPr lang="en-GB" dirty="0">
+                <a:solidFill>
+                  <a:prstClr val="black">
+                    <a:lumMod val="95000"/>
+                    <a:lumOff val="5000"/>
+                  </a:prstClr>
+                </a:solidFill>
+                <a:latin typeface="Arial" panose="020B0604020202020204" pitchFamily="34" charset="0"/>
+                <a:cs typeface="Arial" panose="020B0604020202020204" pitchFamily="34" charset="0"/>
+              </a:rPr>
+              <a:t>After seeing the advice, you will then be asked for a final decision (LEFT or RIGHT) and again how confident you are in this decision.  Your previous answer and confidence will be displayed, and you can adjust this answer and/or confidence prior to your final answer.</a:t>
+            </a:r>
+          </a:p>
+          <a:p>
+            <a:pPr marL="285750" lvl="0" indent="-285750">
+              <a:buFont typeface="Arial" panose="020B0604020202020204" pitchFamily="34" charset="0"/>
+              <a:buChar char="•"/>
+              <a:defRPr/>
+            </a:pPr>
+            <a:endParaRPr lang="en-GB" dirty="0">
+              <a:solidFill>
+                <a:prstClr val="black">
+                  <a:lumMod val="95000"/>
+                  <a:lumOff val="5000"/>
+                </a:prstClr>
+              </a:solidFill>
+              <a:latin typeface="Arial" panose="020B0604020202020204" pitchFamily="34" charset="0"/>
+              <a:cs typeface="Arial" panose="020B0604020202020204" pitchFamily="34" charset="0"/>
+            </a:endParaRPr>
+          </a:p>
+          <a:p>
+            <a:pPr marL="285750" lvl="0" indent="-285750">
+              <a:buFont typeface="Arial" panose="020B0604020202020204" pitchFamily="34" charset="0"/>
+              <a:buChar char="•"/>
+              <a:defRPr/>
+            </a:pPr>
+            <a:r>
+              <a:rPr lang="en-GB" dirty="0">
+                <a:solidFill>
+                  <a:prstClr val="black">
+                    <a:lumMod val="95000"/>
+                    <a:lumOff val="5000"/>
+                  </a:prstClr>
+                </a:solidFill>
+                <a:latin typeface="Arial" panose="020B0604020202020204" pitchFamily="34" charset="0"/>
+                <a:cs typeface="Arial" panose="020B0604020202020204" pitchFamily="34" charset="0"/>
+              </a:rPr>
+              <a:t>Confirm your final answer by clicking Continue.  Only this final answer will count towards your percent correct.</a:t>
+            </a:r>
+          </a:p>
+          <a:p>
+            <a:pPr marL="285750" marR="0" lvl="0" indent="-285750" defTabSz="914400" rtl="0" eaLnBrk="1" fontAlgn="auto" latinLnBrk="0" hangingPunct="1">
+              <a:lnSpc>
+                <a:spcPct val="100000"/>
+              </a:lnSpc>
+              <a:spcBef>
+                <a:spcPts val="0"/>
+              </a:spcBef>
+              <a:spcAft>
+                <a:spcPts val="0"/>
+              </a:spcAft>
+              <a:buClrTx/>
+              <a:buSzTx/>
+              <a:buFont typeface="Arial" panose="020B0604020202020204" pitchFamily="34" charset="0"/>
+              <a:buChar char="•"/>
+              <a:tabLst/>
+              <a:defRPr/>
+            </a:pPr>
+            <a:endParaRPr kumimoji="0" lang="en-GB" sz="1800" b="0" i="0" u="none" strike="noStrike" kern="1200" cap="none" spc="0" normalizeH="0" baseline="0" noProof="0" dirty="0">
+              <a:ln>
+                <a:noFill/>
+              </a:ln>
+              <a:solidFill>
+                <a:prstClr val="black">
+                  <a:lumMod val="95000"/>
+                  <a:lumOff val="5000"/>
+                </a:prstClr>
+              </a:solidFill>
+              <a:effectLst/>
+              <a:uLnTx/>
+              <a:uFillTx/>
+              <a:latin typeface="Arial" panose="020B0604020202020204" pitchFamily="34" charset="0"/>
+              <a:ea typeface="+mn-ea"/>
+              <a:cs typeface="Arial" panose="020B0604020202020204" pitchFamily="34" charset="0"/>
+            </a:endParaRPr>
+          </a:p>
+          <a:p>
+            <a:pPr marL="285750" marR="0" lvl="0" indent="-285750" defTabSz="914400" rtl="0" eaLnBrk="1" fontAlgn="auto" latinLnBrk="0" hangingPunct="1">
+              <a:lnSpc>
+                <a:spcPct val="100000"/>
+              </a:lnSpc>
+              <a:spcBef>
+                <a:spcPts val="0"/>
+              </a:spcBef>
+              <a:spcAft>
+                <a:spcPts val="0"/>
+              </a:spcAft>
+              <a:buClrTx/>
+              <a:buSzTx/>
+              <a:buFont typeface="Arial" panose="020B0604020202020204" pitchFamily="34" charset="0"/>
+              <a:buChar char="•"/>
+              <a:tabLst/>
+              <a:defRPr/>
+            </a:pPr>
+            <a:endParaRPr kumimoji="0" lang="en-GB" sz="1800" b="0" i="0" u="none" strike="noStrike" kern="1200" cap="none" spc="0" normalizeH="0" baseline="0" noProof="0" dirty="0">
+              <a:ln>
+                <a:noFill/>
+              </a:ln>
+              <a:solidFill>
+                <a:prstClr val="black">
+                  <a:lumMod val="95000"/>
+                  <a:lumOff val="5000"/>
+                </a:prstClr>
+              </a:solidFill>
+              <a:effectLst/>
+              <a:uLnTx/>
+              <a:uFillTx/>
+              <a:latin typeface="Arial" panose="020B0604020202020204" pitchFamily="34" charset="0"/>
+              <a:ea typeface="+mn-ea"/>
+              <a:cs typeface="Arial" panose="020B0604020202020204" pitchFamily="34" charset="0"/>
+            </a:endParaRPr>
+          </a:p>
+        </p:txBody>
+      </p:sp>
+      <p:sp>
+        <p:nvSpPr>
+          <p:cNvPr id="6" name="TextBox 5">
+            <a:extLst>
+              <a:ext uri="{FF2B5EF4-FFF2-40B4-BE49-F238E27FC236}">
+                <a16:creationId xmlns:a16="http://schemas.microsoft.com/office/drawing/2014/main" id="{59D58373-4C61-FF4F-A745-049751E8D08E}"/>
+              </a:ext>
+            </a:extLst>
+          </p:cNvPr>
+          <p:cNvSpPr txBox="1"/>
+          <p:nvPr/>
+        </p:nvSpPr>
+        <p:spPr>
+          <a:xfrm>
+            <a:off x="2641824" y="6093296"/>
+            <a:ext cx="3860352" cy="954107"/>
+          </a:xfrm>
+          <a:prstGeom prst="rect">
+            <a:avLst/>
+          </a:prstGeom>
+          <a:noFill/>
+        </p:spPr>
+        <p:txBody>
+          <a:bodyPr wrap="none" rtlCol="0">
+            <a:spAutoFit/>
+          </a:bodyPr>
+          <a:lstStyle/>
+          <a:p>
+            <a:pPr>
+              <a:defRPr/>
+            </a:pPr>
+            <a:r>
+              <a:rPr lang="en-GB" sz="2800" dirty="0">
+                <a:solidFill>
+                  <a:schemeClr val="bg1">
+                    <a:lumMod val="95000"/>
+                    <a:lumOff val="5000"/>
+                  </a:schemeClr>
+                </a:solidFill>
+                <a:latin typeface="Arial" panose="020B0604020202020204" pitchFamily="34" charset="0"/>
+                <a:cs typeface="Arial" panose="020B0604020202020204" pitchFamily="34" charset="0"/>
+              </a:rPr>
+              <a:t>[Click Next to continue]</a:t>
+            </a:r>
+          </a:p>
+          <a:p>
+            <a:pPr marL="0" marR="0" lvl="0" indent="0" algn="l" defTabSz="914400" rtl="0" eaLnBrk="1" fontAlgn="auto" latinLnBrk="0" hangingPunct="1">
+              <a:lnSpc>
+                <a:spcPct val="100000"/>
+              </a:lnSpc>
+              <a:spcBef>
+                <a:spcPts val="0"/>
+              </a:spcBef>
+              <a:spcAft>
+                <a:spcPts val="0"/>
+              </a:spcAft>
+              <a:buClrTx/>
+              <a:buSzTx/>
+              <a:buFontTx/>
+              <a:buNone/>
+              <a:tabLst/>
+              <a:defRPr/>
+            </a:pPr>
+            <a:endParaRPr kumimoji="0" lang="en-GB" sz="2800" b="0" i="0" u="none" strike="noStrike" kern="1200" cap="none" spc="0" normalizeH="0" baseline="0" noProof="0" dirty="0">
+              <a:ln>
+                <a:noFill/>
+              </a:ln>
+              <a:solidFill>
+                <a:prstClr val="black">
+                  <a:lumMod val="95000"/>
+                  <a:lumOff val="5000"/>
+                </a:prstClr>
+              </a:solidFill>
+              <a:effectLst/>
+              <a:uLnTx/>
+              <a:uFillTx/>
+              <a:latin typeface="Arial" panose="020B0604020202020204" pitchFamily="34" charset="0"/>
+              <a:ea typeface="+mn-ea"/>
+              <a:cs typeface="Arial" panose="020B0604020202020204" pitchFamily="34" charset="0"/>
+            </a:endParaRPr>
+          </a:p>
+        </p:txBody>
+      </p:sp>
+    </p:spTree>
+    <p:extLst>
+      <p:ext uri="{BB962C8B-B14F-4D97-AF65-F5344CB8AC3E}">
+        <p14:creationId xmlns:p14="http://schemas.microsoft.com/office/powerpoint/2010/main" val="449852918"/>
+      </p:ext>
+    </p:extLst>
+  </p:cSld>
+  <p:clrMapOvr>
+    <a:masterClrMapping/>
+  </p:clrMapOvr>
+</p:sld>
+</file>
+
+<file path=ppt/slides/slide22.xml><?xml version="1.0" encoding="utf-8"?>
+<p:sld xmlns:a="http://schemas.openxmlformats.org/drawingml/2006/main" xmlns:r="http://schemas.openxmlformats.org/officeDocument/2006/relationships" xmlns:p="http://schemas.openxmlformats.org/presentationml/2006/main">
+  <p:cSld>
+    <p:spTree>
+      <p:nvGrpSpPr>
+        <p:cNvPr id="1" name=""/>
+        <p:cNvGrpSpPr/>
+        <p:nvPr/>
+      </p:nvGrpSpPr>
+      <p:grpSpPr>
+        <a:xfrm>
+          <a:off x="0" y="0"/>
+          <a:ext cx="0" cy="0"/>
+          <a:chOff x="0" y="0"/>
+          <a:chExt cx="0" cy="0"/>
+        </a:xfrm>
+      </p:grpSpPr>
+      <p:sp>
+        <p:nvSpPr>
+          <p:cNvPr id="5" name="TextBox 4"/>
+          <p:cNvSpPr txBox="1"/>
+          <p:nvPr/>
+        </p:nvSpPr>
+        <p:spPr>
+          <a:xfrm>
+            <a:off x="539552" y="764704"/>
+            <a:ext cx="8190305" cy="2246769"/>
+          </a:xfrm>
+          <a:prstGeom prst="rect">
+            <a:avLst/>
+          </a:prstGeom>
+          <a:noFill/>
+        </p:spPr>
+        <p:txBody>
+          <a:bodyPr wrap="square" rtlCol="0">
+            <a:spAutoFit/>
+          </a:bodyPr>
+          <a:lstStyle/>
+          <a:p>
+            <a:pPr marL="0" marR="0" lvl="0" indent="0" algn="ctr" defTabSz="914400" rtl="0" eaLnBrk="1" fontAlgn="auto" latinLnBrk="0" hangingPunct="1">
+              <a:lnSpc>
+                <a:spcPct val="100000"/>
+              </a:lnSpc>
+              <a:spcBef>
+                <a:spcPts val="0"/>
+              </a:spcBef>
+              <a:spcAft>
+                <a:spcPts val="0"/>
+              </a:spcAft>
+              <a:buClrTx/>
+              <a:buSzTx/>
+              <a:buFontTx/>
+              <a:buNone/>
+              <a:tabLst/>
+              <a:defRPr/>
+            </a:pPr>
+            <a:r>
+              <a:rPr kumimoji="0" lang="en-GB" sz="2800" b="0" i="0" u="none" strike="noStrike" kern="1200" cap="none" spc="0" normalizeH="0" baseline="0" noProof="0" dirty="0">
+                <a:ln>
+                  <a:noFill/>
+                </a:ln>
+                <a:solidFill>
+                  <a:prstClr val="black">
+                    <a:lumMod val="95000"/>
+                    <a:lumOff val="5000"/>
+                  </a:prstClr>
+                </a:solidFill>
+                <a:effectLst/>
+                <a:uLnTx/>
+                <a:uFillTx/>
+                <a:latin typeface="Arial" panose="020B0604020202020204" pitchFamily="34" charset="0"/>
+                <a:ea typeface="+mn-ea"/>
+                <a:cs typeface="Arial" panose="020B0604020202020204" pitchFamily="34" charset="0"/>
+              </a:rPr>
+              <a:t>You will now start the 2</a:t>
+            </a:r>
+            <a:r>
+              <a:rPr kumimoji="0" lang="en-GB" sz="2800" b="0" i="0" u="none" strike="noStrike" kern="1200" cap="none" spc="0" normalizeH="0" baseline="30000" noProof="0" dirty="0">
+                <a:ln>
+                  <a:noFill/>
+                </a:ln>
+                <a:solidFill>
+                  <a:prstClr val="black">
+                    <a:lumMod val="95000"/>
+                    <a:lumOff val="5000"/>
+                  </a:prstClr>
+                </a:solidFill>
+                <a:effectLst/>
+                <a:uLnTx/>
+                <a:uFillTx/>
+                <a:latin typeface="Arial" panose="020B0604020202020204" pitchFamily="34" charset="0"/>
+                <a:ea typeface="+mn-ea"/>
+                <a:cs typeface="Arial" panose="020B0604020202020204" pitchFamily="34" charset="0"/>
+              </a:rPr>
+              <a:t>nd</a:t>
+            </a:r>
+            <a:r>
+              <a:rPr kumimoji="0" lang="en-GB" sz="2800" b="0" i="0" u="none" strike="noStrike" kern="1200" cap="none" spc="0" normalizeH="0" baseline="0" noProof="0" dirty="0">
+                <a:ln>
+                  <a:noFill/>
+                </a:ln>
+                <a:solidFill>
+                  <a:prstClr val="black">
+                    <a:lumMod val="95000"/>
+                    <a:lumOff val="5000"/>
+                  </a:prstClr>
+                </a:solidFill>
+                <a:effectLst/>
+                <a:uLnTx/>
+                <a:uFillTx/>
+                <a:latin typeface="Arial" panose="020B0604020202020204" pitchFamily="34" charset="0"/>
+                <a:ea typeface="+mn-ea"/>
+                <a:cs typeface="Arial" panose="020B0604020202020204" pitchFamily="34" charset="0"/>
+              </a:rPr>
+              <a:t> Practice Phase, which is made up of 1 block of trials.</a:t>
+            </a:r>
+          </a:p>
+          <a:p>
+            <a:pPr marL="0" marR="0" lvl="0" indent="0" algn="ctr" defTabSz="914400" rtl="0" eaLnBrk="1" fontAlgn="auto" latinLnBrk="0" hangingPunct="1">
+              <a:lnSpc>
+                <a:spcPct val="100000"/>
+              </a:lnSpc>
+              <a:spcBef>
+                <a:spcPts val="0"/>
+              </a:spcBef>
+              <a:spcAft>
+                <a:spcPts val="0"/>
+              </a:spcAft>
+              <a:buClrTx/>
+              <a:buSzTx/>
+              <a:buFontTx/>
+              <a:buNone/>
+              <a:tabLst/>
+              <a:defRPr/>
+            </a:pPr>
+            <a:endParaRPr kumimoji="0" lang="en-GB" sz="2800" b="0" i="0" u="none" strike="noStrike" kern="1200" cap="none" spc="0" normalizeH="0" baseline="0" noProof="0" dirty="0">
+              <a:ln>
+                <a:noFill/>
+              </a:ln>
+              <a:solidFill>
+                <a:prstClr val="black">
+                  <a:lumMod val="95000"/>
+                  <a:lumOff val="5000"/>
+                </a:prstClr>
+              </a:solidFill>
+              <a:effectLst/>
+              <a:uLnTx/>
+              <a:uFillTx/>
+              <a:latin typeface="Arial" panose="020B0604020202020204" pitchFamily="34" charset="0"/>
+              <a:ea typeface="+mn-ea"/>
+              <a:cs typeface="Arial" panose="020B0604020202020204" pitchFamily="34" charset="0"/>
+            </a:endParaRPr>
+          </a:p>
+          <a:p>
+            <a:pPr marL="0" marR="0" lvl="0" indent="0" algn="ctr" defTabSz="914400" rtl="0" eaLnBrk="1" fontAlgn="auto" latinLnBrk="0" hangingPunct="1">
+              <a:lnSpc>
+                <a:spcPct val="100000"/>
+              </a:lnSpc>
+              <a:spcBef>
+                <a:spcPts val="0"/>
+              </a:spcBef>
+              <a:spcAft>
+                <a:spcPts val="0"/>
+              </a:spcAft>
+              <a:buClrTx/>
+              <a:buSzTx/>
+              <a:buFontTx/>
+              <a:buNone/>
+              <a:tabLst/>
+              <a:defRPr/>
+            </a:pPr>
+            <a:endParaRPr kumimoji="0" lang="en-GB" sz="2800" b="0" i="0" u="none" strike="noStrike" kern="1200" cap="none" spc="0" normalizeH="0" baseline="0" noProof="0" dirty="0">
+              <a:ln>
+                <a:noFill/>
+              </a:ln>
+              <a:solidFill>
+                <a:prstClr val="black">
+                  <a:lumMod val="95000"/>
+                  <a:lumOff val="5000"/>
+                </a:prstClr>
+              </a:solidFill>
+              <a:effectLst/>
+              <a:uLnTx/>
+              <a:uFillTx/>
+              <a:latin typeface="Arial" panose="020B0604020202020204" pitchFamily="34" charset="0"/>
+              <a:ea typeface="+mn-ea"/>
+              <a:cs typeface="Arial" panose="020B0604020202020204" pitchFamily="34" charset="0"/>
+            </a:endParaRPr>
+          </a:p>
+          <a:p>
+            <a:pPr marL="0" marR="0" lvl="0" indent="0" algn="ctr" defTabSz="914400" rtl="0" eaLnBrk="1" fontAlgn="auto" latinLnBrk="0" hangingPunct="1">
+              <a:lnSpc>
+                <a:spcPct val="100000"/>
+              </a:lnSpc>
+              <a:spcBef>
+                <a:spcPts val="0"/>
+              </a:spcBef>
+              <a:spcAft>
+                <a:spcPts val="0"/>
+              </a:spcAft>
+              <a:buClrTx/>
+              <a:buSzTx/>
+              <a:buFontTx/>
+              <a:buNone/>
+              <a:tabLst/>
+              <a:defRPr/>
+            </a:pPr>
+            <a:r>
+              <a:rPr kumimoji="0" lang="en-GB" sz="2800" b="0" i="0" u="none" strike="noStrike" kern="1200" cap="none" spc="0" normalizeH="0" baseline="0" noProof="0" dirty="0">
+                <a:ln>
+                  <a:noFill/>
+                </a:ln>
+                <a:solidFill>
+                  <a:prstClr val="black">
+                    <a:lumMod val="95000"/>
+                    <a:lumOff val="5000"/>
+                  </a:prstClr>
+                </a:solidFill>
+                <a:effectLst/>
+                <a:uLnTx/>
+                <a:uFillTx/>
+                <a:latin typeface="Arial" panose="020B0604020202020204" pitchFamily="34" charset="0"/>
+                <a:ea typeface="+mn-ea"/>
+                <a:cs typeface="Arial" panose="020B0604020202020204" pitchFamily="34" charset="0"/>
+              </a:rPr>
+              <a:t>Click Next to start the 2</a:t>
+            </a:r>
+            <a:r>
+              <a:rPr kumimoji="0" lang="en-GB" sz="2800" b="0" i="0" u="none" strike="noStrike" kern="1200" cap="none" spc="0" normalizeH="0" baseline="30000" noProof="0" dirty="0">
+                <a:ln>
+                  <a:noFill/>
+                </a:ln>
+                <a:solidFill>
+                  <a:prstClr val="black">
+                    <a:lumMod val="95000"/>
+                    <a:lumOff val="5000"/>
+                  </a:prstClr>
+                </a:solidFill>
+                <a:effectLst/>
+                <a:uLnTx/>
+                <a:uFillTx/>
+                <a:latin typeface="Arial" panose="020B0604020202020204" pitchFamily="34" charset="0"/>
+                <a:ea typeface="+mn-ea"/>
+                <a:cs typeface="Arial" panose="020B0604020202020204" pitchFamily="34" charset="0"/>
+              </a:rPr>
+              <a:t>nd</a:t>
+            </a:r>
+            <a:r>
+              <a:rPr kumimoji="0" lang="en-GB" sz="2800" b="0" i="0" u="none" strike="noStrike" kern="1200" cap="none" spc="0" normalizeH="0" baseline="0" noProof="0" dirty="0">
+                <a:ln>
+                  <a:noFill/>
+                </a:ln>
+                <a:solidFill>
+                  <a:prstClr val="black">
+                    <a:lumMod val="95000"/>
+                    <a:lumOff val="5000"/>
+                  </a:prstClr>
+                </a:solidFill>
+                <a:effectLst/>
+                <a:uLnTx/>
+                <a:uFillTx/>
+                <a:latin typeface="Arial" panose="020B0604020202020204" pitchFamily="34" charset="0"/>
+                <a:ea typeface="+mn-ea"/>
+                <a:cs typeface="Arial" panose="020B0604020202020204" pitchFamily="34" charset="0"/>
+              </a:rPr>
+              <a:t> Practice Phase</a:t>
+            </a:r>
+          </a:p>
+        </p:txBody>
+      </p:sp>
+    </p:spTree>
+    <p:extLst>
+      <p:ext uri="{BB962C8B-B14F-4D97-AF65-F5344CB8AC3E}">
+        <p14:creationId xmlns:p14="http://schemas.microsoft.com/office/powerpoint/2010/main" val="107858165"/>
+      </p:ext>
+    </p:extLst>
+  </p:cSld>
+  <p:clrMapOvr>
+    <a:masterClrMapping/>
+  </p:clrMapOvr>
+</p:sld>
+</file>
+
+<file path=ppt/slides/slide23.xml><?xml version="1.0" encoding="utf-8"?>
+<p:sld xmlns:a="http://schemas.openxmlformats.org/drawingml/2006/main" xmlns:r="http://schemas.openxmlformats.org/officeDocument/2006/relationships" xmlns:p="http://schemas.openxmlformats.org/presentationml/2006/main">
+  <p:cSld>
+    <p:spTree>
+      <p:nvGrpSpPr>
+        <p:cNvPr id="1" name=""/>
+        <p:cNvGrpSpPr/>
+        <p:nvPr/>
+      </p:nvGrpSpPr>
+      <p:grpSpPr>
+        <a:xfrm>
+          <a:off x="0" y="0"/>
+          <a:ext cx="0" cy="0"/>
+          <a:chOff x="0" y="0"/>
+          <a:chExt cx="0" cy="0"/>
+        </a:xfrm>
+      </p:grpSpPr>
+      <p:sp>
+        <p:nvSpPr>
+          <p:cNvPr id="5" name="TextBox 4"/>
+          <p:cNvSpPr txBox="1"/>
+          <p:nvPr/>
+        </p:nvSpPr>
+        <p:spPr>
+          <a:xfrm>
+            <a:off x="489522" y="1124744"/>
+            <a:ext cx="8190305" cy="3693319"/>
+          </a:xfrm>
+          <a:prstGeom prst="rect">
+            <a:avLst/>
+          </a:prstGeom>
+          <a:noFill/>
+        </p:spPr>
+        <p:txBody>
+          <a:bodyPr wrap="square" rtlCol="0">
+            <a:spAutoFit/>
+          </a:bodyPr>
+          <a:lstStyle/>
+          <a:p>
+            <a:pPr algn="ctr"/>
+            <a:r>
+              <a:rPr lang="en-US" dirty="0">
+                <a:solidFill>
+                  <a:schemeClr val="bg1">
+                    <a:lumMod val="95000"/>
+                    <a:lumOff val="5000"/>
+                  </a:schemeClr>
+                </a:solidFill>
+                <a:latin typeface="Arial" panose="020B0604020202020204" pitchFamily="34" charset="0"/>
+                <a:cs typeface="Arial" panose="020B0604020202020204" pitchFamily="34" charset="0"/>
+              </a:rPr>
+              <a:t>Now the Experimental Phase will begin</a:t>
+            </a:r>
+          </a:p>
+          <a:p>
+            <a:pPr algn="ctr"/>
+            <a:endParaRPr lang="en-US" dirty="0">
+              <a:solidFill>
+                <a:schemeClr val="bg1">
+                  <a:lumMod val="95000"/>
+                  <a:lumOff val="5000"/>
+                </a:schemeClr>
+              </a:solidFill>
+              <a:latin typeface="Arial" panose="020B0604020202020204" pitchFamily="34" charset="0"/>
+              <a:cs typeface="Arial" panose="020B0604020202020204" pitchFamily="34" charset="0"/>
+            </a:endParaRPr>
+          </a:p>
+          <a:p>
+            <a:pPr algn="ctr"/>
+            <a:r>
+              <a:rPr lang="en-US" dirty="0">
+                <a:solidFill>
+                  <a:schemeClr val="bg1">
+                    <a:lumMod val="95000"/>
+                    <a:lumOff val="5000"/>
+                  </a:schemeClr>
+                </a:solidFill>
+                <a:latin typeface="Arial" panose="020B0604020202020204" pitchFamily="34" charset="0"/>
+                <a:cs typeface="Arial" panose="020B0604020202020204" pitchFamily="34" charset="0"/>
+              </a:rPr>
+              <a:t>The final portion of the experiment will continue using the same task as well as the same advisors you used in the last block of trials.</a:t>
+            </a:r>
+          </a:p>
+          <a:p>
+            <a:pPr algn="ctr"/>
+            <a:endParaRPr lang="en-US" dirty="0">
+              <a:solidFill>
+                <a:schemeClr val="bg1">
+                  <a:lumMod val="95000"/>
+                  <a:lumOff val="5000"/>
+                </a:schemeClr>
+              </a:solidFill>
+              <a:latin typeface="Arial" panose="020B0604020202020204" pitchFamily="34" charset="0"/>
+              <a:cs typeface="Arial" panose="020B0604020202020204" pitchFamily="34" charset="0"/>
+            </a:endParaRPr>
+          </a:p>
+          <a:p>
+            <a:pPr algn="ctr"/>
+            <a:r>
+              <a:rPr lang="en-US" dirty="0">
+                <a:solidFill>
+                  <a:schemeClr val="bg1">
+                    <a:lumMod val="95000"/>
+                    <a:lumOff val="5000"/>
+                  </a:schemeClr>
+                </a:solidFill>
+                <a:latin typeface="Arial" panose="020B0604020202020204" pitchFamily="34" charset="0"/>
+                <a:cs typeface="Arial" panose="020B0604020202020204" pitchFamily="34" charset="0"/>
+              </a:rPr>
+              <a:t>However, in this portion of the experiment, you will have some trials where only one advisor option is given.  </a:t>
+            </a:r>
+          </a:p>
+          <a:p>
+            <a:pPr algn="ctr"/>
+            <a:endParaRPr lang="en-US" dirty="0">
+              <a:solidFill>
+                <a:schemeClr val="bg1">
+                  <a:lumMod val="95000"/>
+                  <a:lumOff val="5000"/>
+                </a:schemeClr>
+              </a:solidFill>
+              <a:latin typeface="Arial" panose="020B0604020202020204" pitchFamily="34" charset="0"/>
+              <a:cs typeface="Arial" panose="020B0604020202020204" pitchFamily="34" charset="0"/>
+            </a:endParaRPr>
+          </a:p>
+          <a:p>
+            <a:pPr algn="ctr"/>
+            <a:r>
+              <a:rPr lang="en-US" dirty="0">
+                <a:solidFill>
+                  <a:schemeClr val="bg1">
+                    <a:lumMod val="95000"/>
+                    <a:lumOff val="5000"/>
+                  </a:schemeClr>
+                </a:solidFill>
+                <a:latin typeface="Arial" panose="020B0604020202020204" pitchFamily="34" charset="0"/>
+                <a:cs typeface="Arial" panose="020B0604020202020204" pitchFamily="34" charset="0"/>
+              </a:rPr>
+              <a:t>In other trials you will have the choice of both advisors.  </a:t>
+            </a:r>
+          </a:p>
+          <a:p>
+            <a:pPr algn="ctr"/>
+            <a:endParaRPr lang="en-US" dirty="0">
+              <a:solidFill>
+                <a:schemeClr val="bg1">
+                  <a:lumMod val="95000"/>
+                  <a:lumOff val="5000"/>
+                </a:schemeClr>
+              </a:solidFill>
+              <a:latin typeface="Arial" panose="020B0604020202020204" pitchFamily="34" charset="0"/>
+              <a:cs typeface="Arial" panose="020B0604020202020204" pitchFamily="34" charset="0"/>
+            </a:endParaRPr>
+          </a:p>
+          <a:p>
+            <a:pPr algn="ctr"/>
+            <a:r>
+              <a:rPr lang="en-GB" dirty="0">
+                <a:solidFill>
+                  <a:schemeClr val="bg1">
+                    <a:lumMod val="95000"/>
+                    <a:lumOff val="5000"/>
+                  </a:schemeClr>
+                </a:solidFill>
+                <a:latin typeface="Arial" panose="020B0604020202020204" pitchFamily="34" charset="0"/>
+                <a:cs typeface="Arial" panose="020B0604020202020204" pitchFamily="34" charset="0"/>
+              </a:rPr>
+              <a:t>It is up to you to decide which advisor to choose to get advice from.  It is also up to you how much you take the advice into account when making your final decision.</a:t>
+            </a:r>
+          </a:p>
+        </p:txBody>
+      </p:sp>
+      <p:sp>
+        <p:nvSpPr>
+          <p:cNvPr id="2" name="TextBox 1"/>
+          <p:cNvSpPr txBox="1"/>
+          <p:nvPr/>
+        </p:nvSpPr>
+        <p:spPr>
+          <a:xfrm>
+            <a:off x="3479757" y="476672"/>
+            <a:ext cx="2113656" cy="584775"/>
+          </a:xfrm>
+          <a:prstGeom prst="rect">
+            <a:avLst/>
+          </a:prstGeom>
+          <a:noFill/>
+        </p:spPr>
+        <p:txBody>
+          <a:bodyPr wrap="none" rtlCol="0">
+            <a:spAutoFit/>
+          </a:bodyPr>
+          <a:lstStyle/>
+          <a:p>
+            <a:r>
+              <a:rPr lang="en-US" sz="3200" dirty="0">
+                <a:solidFill>
+                  <a:schemeClr val="accent1">
+                    <a:lumMod val="50000"/>
+                  </a:schemeClr>
+                </a:solidFill>
+                <a:latin typeface="Arial" panose="020B0604020202020204" pitchFamily="34" charset="0"/>
+                <a:cs typeface="Arial" panose="020B0604020202020204" pitchFamily="34" charset="0"/>
+              </a:rPr>
+              <a:t>Well done!</a:t>
+            </a:r>
+            <a:endParaRPr lang="en-GB" sz="3200" dirty="0">
+              <a:solidFill>
+                <a:schemeClr val="accent1">
+                  <a:lumMod val="50000"/>
+                </a:schemeClr>
+              </a:solidFill>
+              <a:latin typeface="Arial" panose="020B0604020202020204" pitchFamily="34" charset="0"/>
+              <a:cs typeface="Arial" panose="020B0604020202020204" pitchFamily="34" charset="0"/>
+            </a:endParaRPr>
+          </a:p>
+        </p:txBody>
+      </p:sp>
+      <p:sp>
+        <p:nvSpPr>
+          <p:cNvPr id="6" name="TextBox 5">
+            <a:extLst>
+              <a:ext uri="{FF2B5EF4-FFF2-40B4-BE49-F238E27FC236}">
+                <a16:creationId xmlns:a16="http://schemas.microsoft.com/office/drawing/2014/main" id="{A691D8AE-BDD1-CF46-B0A5-61758D431058}"/>
+              </a:ext>
+            </a:extLst>
+          </p:cNvPr>
+          <p:cNvSpPr txBox="1"/>
+          <p:nvPr/>
+        </p:nvSpPr>
+        <p:spPr>
+          <a:xfrm>
+            <a:off x="2641824" y="6093296"/>
+            <a:ext cx="3860352" cy="954107"/>
+          </a:xfrm>
+          <a:prstGeom prst="rect">
+            <a:avLst/>
+          </a:prstGeom>
+          <a:noFill/>
+        </p:spPr>
+        <p:txBody>
+          <a:bodyPr wrap="none" rtlCol="0">
+            <a:spAutoFit/>
+          </a:bodyPr>
+          <a:lstStyle/>
+          <a:p>
+            <a:pPr>
+              <a:defRPr/>
+            </a:pPr>
+            <a:r>
+              <a:rPr lang="en-GB" sz="2800" dirty="0">
+                <a:solidFill>
+                  <a:schemeClr val="bg1">
+                    <a:lumMod val="95000"/>
+                    <a:lumOff val="5000"/>
+                  </a:schemeClr>
+                </a:solidFill>
+                <a:latin typeface="Arial" panose="020B0604020202020204" pitchFamily="34" charset="0"/>
+                <a:cs typeface="Arial" panose="020B0604020202020204" pitchFamily="34" charset="0"/>
+              </a:rPr>
+              <a:t>[Click Next to continue]</a:t>
+            </a:r>
+          </a:p>
+          <a:p>
+            <a:pPr marL="0" marR="0" lvl="0" indent="0" algn="l" defTabSz="914400" rtl="0" eaLnBrk="1" fontAlgn="auto" latinLnBrk="0" hangingPunct="1">
+              <a:lnSpc>
+                <a:spcPct val="100000"/>
+              </a:lnSpc>
+              <a:spcBef>
+                <a:spcPts val="0"/>
+              </a:spcBef>
+              <a:spcAft>
+                <a:spcPts val="0"/>
+              </a:spcAft>
+              <a:buClrTx/>
+              <a:buSzTx/>
+              <a:buFontTx/>
+              <a:buNone/>
+              <a:tabLst/>
+              <a:defRPr/>
+            </a:pPr>
+            <a:endParaRPr kumimoji="0" lang="en-GB" sz="2800" b="0" i="0" u="none" strike="noStrike" kern="1200" cap="none" spc="0" normalizeH="0" baseline="0" noProof="0" dirty="0">
+              <a:ln>
+                <a:noFill/>
+              </a:ln>
+              <a:solidFill>
+                <a:prstClr val="black">
+                  <a:lumMod val="95000"/>
+                  <a:lumOff val="5000"/>
+                </a:prstClr>
+              </a:solidFill>
+              <a:effectLst/>
+              <a:uLnTx/>
+              <a:uFillTx/>
+              <a:latin typeface="Arial" panose="020B0604020202020204" pitchFamily="34" charset="0"/>
+              <a:ea typeface="+mn-ea"/>
+              <a:cs typeface="Arial" panose="020B0604020202020204" pitchFamily="34" charset="0"/>
+            </a:endParaRPr>
+          </a:p>
+        </p:txBody>
+      </p:sp>
+    </p:spTree>
+    <p:extLst>
+      <p:ext uri="{BB962C8B-B14F-4D97-AF65-F5344CB8AC3E}">
+        <p14:creationId xmlns:p14="http://schemas.microsoft.com/office/powerpoint/2010/main" val="2587808893"/>
+      </p:ext>
+    </p:extLst>
+  </p:cSld>
+  <p:clrMapOvr>
+    <a:masterClrMapping/>
+  </p:clrMapOvr>
+</p:sld>
+</file>
+
+<file path=ppt/slides/slide24.xml><?xml version="1.0" encoding="utf-8"?>
+<p:sld xmlns:a="http://schemas.openxmlformats.org/drawingml/2006/main" xmlns:r="http://schemas.openxmlformats.org/officeDocument/2006/relationships" xmlns:p="http://schemas.openxmlformats.org/presentationml/2006/main">
+  <p:cSld>
+    <p:spTree>
+      <p:nvGrpSpPr>
+        <p:cNvPr id="1" name=""/>
+        <p:cNvGrpSpPr/>
+        <p:nvPr/>
+      </p:nvGrpSpPr>
+      <p:grpSpPr>
+        <a:xfrm>
+          <a:off x="0" y="0"/>
+          <a:ext cx="0" cy="0"/>
+          <a:chOff x="0" y="0"/>
+          <a:chExt cx="0" cy="0"/>
+        </a:xfrm>
+      </p:grpSpPr>
+      <p:sp>
+        <p:nvSpPr>
+          <p:cNvPr id="5" name="TextBox 4"/>
+          <p:cNvSpPr txBox="1"/>
+          <p:nvPr/>
+        </p:nvSpPr>
+        <p:spPr>
+          <a:xfrm>
+            <a:off x="539552" y="764704"/>
+            <a:ext cx="8190305" cy="2246769"/>
+          </a:xfrm>
+          <a:prstGeom prst="rect">
+            <a:avLst/>
+          </a:prstGeom>
+          <a:noFill/>
+        </p:spPr>
+        <p:txBody>
+          <a:bodyPr wrap="square" rtlCol="0">
+            <a:spAutoFit/>
+          </a:bodyPr>
+          <a:lstStyle/>
+          <a:p>
+            <a:pPr algn="ctr"/>
+            <a:r>
+              <a:rPr lang="en-GB" sz="2800" dirty="0">
+                <a:solidFill>
+                  <a:schemeClr val="bg1">
+                    <a:lumMod val="95000"/>
+                    <a:lumOff val="5000"/>
+                  </a:schemeClr>
+                </a:solidFill>
+                <a:latin typeface="Arial" panose="020B0604020202020204" pitchFamily="34" charset="0"/>
+                <a:cs typeface="Arial" panose="020B0604020202020204" pitchFamily="34" charset="0"/>
+              </a:rPr>
+              <a:t>You will now start the Experimental Phase, which is made up of 6 blocks of trials in total.</a:t>
+            </a:r>
+          </a:p>
+          <a:p>
+            <a:pPr algn="ctr"/>
+            <a:endParaRPr lang="en-GB" sz="2800" dirty="0">
+              <a:solidFill>
+                <a:schemeClr val="bg1">
+                  <a:lumMod val="95000"/>
+                  <a:lumOff val="5000"/>
+                </a:schemeClr>
+              </a:solidFill>
+              <a:latin typeface="Arial" panose="020B0604020202020204" pitchFamily="34" charset="0"/>
+              <a:cs typeface="Arial" panose="020B0604020202020204" pitchFamily="34" charset="0"/>
+            </a:endParaRPr>
+          </a:p>
+          <a:p>
+            <a:pPr algn="ctr"/>
+            <a:endParaRPr lang="en-GB" sz="2800" dirty="0">
+              <a:solidFill>
+                <a:schemeClr val="bg1">
+                  <a:lumMod val="95000"/>
+                  <a:lumOff val="5000"/>
+                </a:schemeClr>
+              </a:solidFill>
+              <a:latin typeface="Arial" panose="020B0604020202020204" pitchFamily="34" charset="0"/>
+              <a:cs typeface="Arial" panose="020B0604020202020204" pitchFamily="34" charset="0"/>
+            </a:endParaRPr>
+          </a:p>
+          <a:p>
+            <a:pPr algn="ctr"/>
+            <a:r>
+              <a:rPr lang="en-GB" sz="2800" dirty="0">
+                <a:solidFill>
+                  <a:schemeClr val="bg1">
+                    <a:lumMod val="95000"/>
+                    <a:lumOff val="5000"/>
+                  </a:schemeClr>
+                </a:solidFill>
+                <a:latin typeface="Arial" panose="020B0604020202020204" pitchFamily="34" charset="0"/>
+                <a:cs typeface="Arial" panose="020B0604020202020204" pitchFamily="34" charset="0"/>
+              </a:rPr>
+              <a:t>Click Next to start the Experimental Phase</a:t>
+            </a:r>
+          </a:p>
+        </p:txBody>
+      </p:sp>
+    </p:spTree>
+    <p:extLst>
+      <p:ext uri="{BB962C8B-B14F-4D97-AF65-F5344CB8AC3E}">
+        <p14:creationId xmlns:p14="http://schemas.microsoft.com/office/powerpoint/2010/main" val="2613284205"/>
       </p:ext>
     </p:extLst>
   </p:cSld>

</xml_diff>